<commit_message>
Write Schema, update MD and presentation
</commit_message>
<xml_diff>
--- a/Presentation/3MF_Volumetric_2018_12_20.pptx
+++ b/Presentation/3MF_Volumetric_2018_12_20.pptx
@@ -5,7 +5,7 @@
     <p:sldMasterId id="2147483648" r:id="rId1"/>
   </p:sldMasterIdLst>
   <p:notesMasterIdLst>
-    <p:notesMasterId r:id="rId19"/>
+    <p:notesMasterId r:id="rId20"/>
   </p:notesMasterIdLst>
   <p:sldIdLst>
     <p:sldId id="256" r:id="rId2"/>
@@ -21,10 +21,11 @@
     <p:sldId id="291" r:id="rId12"/>
     <p:sldId id="288" r:id="rId13"/>
     <p:sldId id="292" r:id="rId14"/>
-    <p:sldId id="297" r:id="rId15"/>
-    <p:sldId id="299" r:id="rId16"/>
-    <p:sldId id="302" r:id="rId17"/>
-    <p:sldId id="303" r:id="rId18"/>
+    <p:sldId id="304" r:id="rId15"/>
+    <p:sldId id="297" r:id="rId16"/>
+    <p:sldId id="299" r:id="rId17"/>
+    <p:sldId id="302" r:id="rId18"/>
+    <p:sldId id="303" r:id="rId19"/>
   </p:sldIdLst>
   <p:sldSz cx="10080625" cy="5670550"/>
   <p:notesSz cx="7559675" cy="10691813"/>
@@ -211,6 +212,7 @@
             <p14:sldId id="291"/>
             <p14:sldId id="288"/>
             <p14:sldId id="292"/>
+            <p14:sldId id="304"/>
             <p14:sldId id="297"/>
             <p14:sldId id="299"/>
             <p14:sldId id="302"/>
@@ -5285,7 +5287,7 @@
               <a:t>Updated: 20th </a:t>
             </a:r>
             <a:r>
-              <a:rPr lang="de-DE" altLang="de-DE" sz="1693" dirty="0" err="1">
+              <a:rPr lang="de-DE" altLang="de-DE" sz="1693">
                 <a:solidFill>
                   <a:srgbClr val="666666"/>
                 </a:solidFill>
@@ -6133,10 +6135,10 @@
       </p:pic>
       <p:pic>
         <p:nvPicPr>
-          <p:cNvPr id="10" name="Picture 9">
+          <p:cNvPr id="9" name="Picture 8">
             <a:extLst>
               <a:ext uri="{FF2B5EF4-FFF2-40B4-BE49-F238E27FC236}">
-                <a16:creationId xmlns:a16="http://schemas.microsoft.com/office/drawing/2014/main" id="{F1B0B00C-9CD4-4617-899D-3D9BC8EB75EF}"/>
+                <a16:creationId xmlns:a16="http://schemas.microsoft.com/office/drawing/2014/main" id="{264A6091-6646-4EF0-A55F-737784D271EF}"/>
               </a:ext>
             </a:extLst>
           </p:cNvPr>
@@ -6144,7 +6146,7 @@
           <p:nvPr/>
         </p:nvPicPr>
         <p:blipFill>
-          <a:blip r:embed="rId4" cstate="print">
+          <a:blip r:embed="rId4">
             <a:extLst>
               <a:ext uri="{28A0092B-C50C-407E-A947-70E740481C1C}">
                 <a14:useLocalDpi xmlns:a14="http://schemas.microsoft.com/office/drawing/2010/main" val="0"/>
@@ -6157,8 +6159,8 @@
         </p:blipFill>
         <p:spPr>
           <a:xfrm>
-            <a:off x="648430" y="2149475"/>
-            <a:ext cx="3334385" cy="1371600"/>
+            <a:off x="359792" y="3945141"/>
+            <a:ext cx="3240360" cy="1451607"/>
           </a:xfrm>
           <a:prstGeom prst="rect">
             <a:avLst/>
@@ -6167,10 +6169,10 @@
       </p:pic>
       <p:pic>
         <p:nvPicPr>
-          <p:cNvPr id="11" name="Picture 10">
+          <p:cNvPr id="12" name="Picture 11">
             <a:extLst>
               <a:ext uri="{FF2B5EF4-FFF2-40B4-BE49-F238E27FC236}">
-                <a16:creationId xmlns:a16="http://schemas.microsoft.com/office/drawing/2014/main" id="{36E52596-AA63-4C5B-90EE-0EA9954C6FCA}"/>
+                <a16:creationId xmlns:a16="http://schemas.microsoft.com/office/drawing/2014/main" id="{4147934A-9405-4667-8750-66EE9DA640B4}"/>
               </a:ext>
             </a:extLst>
           </p:cNvPr>
@@ -6178,21 +6180,261 @@
           <p:nvPr/>
         </p:nvPicPr>
         <p:blipFill>
-          <a:blip r:embed="rId5"/>
+          <a:blip r:embed="rId5">
+            <a:extLst>
+              <a:ext uri="{28A0092B-C50C-407E-A947-70E740481C1C}">
+                <a14:useLocalDpi xmlns:a14="http://schemas.microsoft.com/office/drawing/2010/main" val="0"/>
+              </a:ext>
+            </a:extLst>
+          </a:blip>
           <a:stretch>
             <a:fillRect/>
           </a:stretch>
         </p:blipFill>
         <p:spPr>
           <a:xfrm>
-            <a:off x="644973" y="3708044"/>
-            <a:ext cx="3644265" cy="875030"/>
+            <a:off x="359792" y="2403257"/>
+            <a:ext cx="3240360" cy="1393703"/>
           </a:xfrm>
           <a:prstGeom prst="rect">
             <a:avLst/>
           </a:prstGeom>
         </p:spPr>
       </p:pic>
+      <p:sp>
+        <p:nvSpPr>
+          <p:cNvPr id="14" name="Rectangle 13">
+            <a:extLst>
+              <a:ext uri="{FF2B5EF4-FFF2-40B4-BE49-F238E27FC236}">
+                <a16:creationId xmlns:a16="http://schemas.microsoft.com/office/drawing/2014/main" id="{670E1978-B888-4D2F-BF7D-A4506E74E79A}"/>
+              </a:ext>
+            </a:extLst>
+          </p:cNvPr>
+          <p:cNvSpPr/>
+          <p:nvPr/>
+        </p:nvSpPr>
+        <p:spPr bwMode="auto">
+          <a:xfrm>
+            <a:off x="784091" y="4180187"/>
+            <a:ext cx="2808312" cy="144016"/>
+          </a:xfrm>
+          <a:prstGeom prst="rect">
+            <a:avLst/>
+          </a:prstGeom>
+          <a:solidFill>
+            <a:srgbClr val="FFC000">
+              <a:alpha val="50000"/>
+            </a:srgbClr>
+          </a:solidFill>
+          <a:ln>
+            <a:noFill/>
+          </a:ln>
+          <a:extLst/>
+        </p:spPr>
+        <p:style>
+          <a:lnRef idx="0">
+            <a:scrgbClr r="0" g="0" b="0"/>
+          </a:lnRef>
+          <a:fillRef idx="0">
+            <a:scrgbClr r="0" g="0" b="0"/>
+          </a:fillRef>
+          <a:effectRef idx="0">
+            <a:scrgbClr r="0" g="0" b="0"/>
+          </a:effectRef>
+          <a:fontRef idx="minor">
+            <a:schemeClr val="lt1"/>
+          </a:fontRef>
+        </p:style>
+        <p:txBody>
+          <a:bodyPr vert="horz" wrap="square" lIns="91440" tIns="45720" rIns="91440" bIns="45720" numCol="1" rtlCol="0" anchor="t" anchorCtr="0" compatLnSpc="1">
+            <a:prstTxWarp prst="textNoShape">
+              <a:avLst/>
+            </a:prstTxWarp>
+          </a:bodyPr>
+          <a:lstStyle/>
+          <a:p>
+            <a:pPr marL="0" marR="0" indent="0" algn="l" defTabSz="449263" rtl="0" eaLnBrk="1" fontAlgn="base" latinLnBrk="0" hangingPunct="0">
+              <a:lnSpc>
+                <a:spcPct val="93000"/>
+              </a:lnSpc>
+              <a:spcBef>
+                <a:spcPct val="0"/>
+              </a:spcBef>
+              <a:spcAft>
+                <a:spcPct val="0"/>
+              </a:spcAft>
+              <a:buClr>
+                <a:srgbClr val="000000"/>
+              </a:buClr>
+              <a:buSzPct val="100000"/>
+              <a:buFont typeface="Times New Roman" panose="02020603050405020304" pitchFamily="18" charset="0"/>
+              <a:buNone/>
+              <a:tabLst/>
+            </a:pPr>
+            <a:endParaRPr kumimoji="0" lang="de-DE" sz="1800" b="0" i="0" u="none" strike="noStrike" cap="none" normalizeH="0" baseline="0">
+              <a:ln>
+                <a:noFill/>
+              </a:ln>
+              <a:effectLst/>
+              <a:latin typeface="Arial" panose="020B0604020202020204" pitchFamily="34" charset="0"/>
+              <a:ea typeface="Microsoft YaHei" panose="020B0503020204020204" pitchFamily="34" charset="-122"/>
+            </a:endParaRPr>
+          </a:p>
+        </p:txBody>
+      </p:sp>
+      <p:sp>
+        <p:nvSpPr>
+          <p:cNvPr id="17" name="Rectangle 16">
+            <a:extLst>
+              <a:ext uri="{FF2B5EF4-FFF2-40B4-BE49-F238E27FC236}">
+                <a16:creationId xmlns:a16="http://schemas.microsoft.com/office/drawing/2014/main" id="{E458C520-E79D-4F41-AE6A-DABEDD0508BE}"/>
+              </a:ext>
+            </a:extLst>
+          </p:cNvPr>
+          <p:cNvSpPr/>
+          <p:nvPr/>
+        </p:nvSpPr>
+        <p:spPr bwMode="auto">
+          <a:xfrm>
+            <a:off x="784091" y="5127339"/>
+            <a:ext cx="2808312" cy="144016"/>
+          </a:xfrm>
+          <a:prstGeom prst="rect">
+            <a:avLst/>
+          </a:prstGeom>
+          <a:solidFill>
+            <a:srgbClr val="FFC000">
+              <a:alpha val="50000"/>
+            </a:srgbClr>
+          </a:solidFill>
+          <a:ln>
+            <a:noFill/>
+          </a:ln>
+          <a:extLst/>
+        </p:spPr>
+        <p:style>
+          <a:lnRef idx="0">
+            <a:scrgbClr r="0" g="0" b="0"/>
+          </a:lnRef>
+          <a:fillRef idx="0">
+            <a:scrgbClr r="0" g="0" b="0"/>
+          </a:fillRef>
+          <a:effectRef idx="0">
+            <a:scrgbClr r="0" g="0" b="0"/>
+          </a:effectRef>
+          <a:fontRef idx="minor">
+            <a:schemeClr val="lt1"/>
+          </a:fontRef>
+        </p:style>
+        <p:txBody>
+          <a:bodyPr vert="horz" wrap="square" lIns="91440" tIns="45720" rIns="91440" bIns="45720" numCol="1" rtlCol="0" anchor="t" anchorCtr="0" compatLnSpc="1">
+            <a:prstTxWarp prst="textNoShape">
+              <a:avLst/>
+            </a:prstTxWarp>
+          </a:bodyPr>
+          <a:lstStyle/>
+          <a:p>
+            <a:pPr marL="0" marR="0" indent="0" algn="l" defTabSz="449263" rtl="0" eaLnBrk="1" fontAlgn="base" latinLnBrk="0" hangingPunct="0">
+              <a:lnSpc>
+                <a:spcPct val="93000"/>
+              </a:lnSpc>
+              <a:spcBef>
+                <a:spcPct val="0"/>
+              </a:spcBef>
+              <a:spcAft>
+                <a:spcPct val="0"/>
+              </a:spcAft>
+              <a:buClr>
+                <a:srgbClr val="000000"/>
+              </a:buClr>
+              <a:buSzPct val="100000"/>
+              <a:buFont typeface="Times New Roman" panose="02020603050405020304" pitchFamily="18" charset="0"/>
+              <a:buNone/>
+              <a:tabLst/>
+            </a:pPr>
+            <a:endParaRPr kumimoji="0" lang="de-DE" sz="1800" b="0" i="0" u="none" strike="noStrike" cap="none" normalizeH="0" baseline="0" dirty="0">
+              <a:ln>
+                <a:noFill/>
+              </a:ln>
+              <a:effectLst/>
+              <a:latin typeface="Arial" panose="020B0604020202020204" pitchFamily="34" charset="0"/>
+              <a:ea typeface="Microsoft YaHei" panose="020B0503020204020204" pitchFamily="34" charset="-122"/>
+            </a:endParaRPr>
+          </a:p>
+        </p:txBody>
+      </p:sp>
+      <p:sp>
+        <p:nvSpPr>
+          <p:cNvPr id="2" name="TextBox 1">
+            <a:extLst>
+              <a:ext uri="{FF2B5EF4-FFF2-40B4-BE49-F238E27FC236}">
+                <a16:creationId xmlns:a16="http://schemas.microsoft.com/office/drawing/2014/main" id="{8ED28B60-837D-4FF1-87FC-E74E6865DE58}"/>
+              </a:ext>
+            </a:extLst>
+          </p:cNvPr>
+          <p:cNvSpPr txBox="1"/>
+          <p:nvPr/>
+        </p:nvSpPr>
+        <p:spPr>
+          <a:xfrm>
+            <a:off x="3528144" y="4971212"/>
+            <a:ext cx="505267" cy="349968"/>
+          </a:xfrm>
+          <a:prstGeom prst="rect">
+            <a:avLst/>
+          </a:prstGeom>
+          <a:noFill/>
+        </p:spPr>
+        <p:txBody>
+          <a:bodyPr wrap="none" rtlCol="0">
+            <a:spAutoFit/>
+          </a:bodyPr>
+          <a:lstStyle/>
+          <a:p>
+            <a:r>
+              <a:rPr lang="en-GB" dirty="0"/>
+              <a:t>g, f</a:t>
+            </a:r>
+            <a:endParaRPr lang="de-DE" dirty="0"/>
+          </a:p>
+        </p:txBody>
+      </p:sp>
+      <p:sp>
+        <p:nvSpPr>
+          <p:cNvPr id="18" name="TextBox 17">
+            <a:extLst>
+              <a:ext uri="{FF2B5EF4-FFF2-40B4-BE49-F238E27FC236}">
+                <a16:creationId xmlns:a16="http://schemas.microsoft.com/office/drawing/2014/main" id="{1C12D704-1E37-4730-8923-F67A26CC83EE}"/>
+              </a:ext>
+            </a:extLst>
+          </p:cNvPr>
+          <p:cNvSpPr txBox="1"/>
+          <p:nvPr/>
+        </p:nvSpPr>
+        <p:spPr>
+          <a:xfrm>
+            <a:off x="3528144" y="4071902"/>
+            <a:ext cx="595035" cy="349968"/>
+          </a:xfrm>
+          <a:prstGeom prst="rect">
+            <a:avLst/>
+          </a:prstGeom>
+          <a:noFill/>
+        </p:spPr>
+        <p:txBody>
+          <a:bodyPr wrap="none" rtlCol="0">
+            <a:spAutoFit/>
+          </a:bodyPr>
+          <a:lstStyle/>
+          <a:p>
+            <a:r>
+              <a:rPr lang="en-GB" dirty="0"/>
+              <a:t>A, b</a:t>
+            </a:r>
+            <a:endParaRPr lang="de-DE" dirty="0"/>
+          </a:p>
+        </p:txBody>
+      </p:sp>
     </p:spTree>
     <p:extLst>
       <p:ext uri="{BB962C8B-B14F-4D97-AF65-F5344CB8AC3E}">
@@ -8662,6 +8904,913 @@
       </p:grpSpPr>
       <p:pic>
         <p:nvPicPr>
+          <p:cNvPr id="11" name="Picture 10">
+            <a:extLst>
+              <a:ext uri="{FF2B5EF4-FFF2-40B4-BE49-F238E27FC236}">
+                <a16:creationId xmlns:a16="http://schemas.microsoft.com/office/drawing/2014/main" id="{2F6FBFFE-5E56-4F28-8E48-BAF583E2BE8C}"/>
+              </a:ext>
+            </a:extLst>
+          </p:cNvPr>
+          <p:cNvPicPr>
+            <a:picLocks noChangeAspect="1"/>
+          </p:cNvPicPr>
+          <p:nvPr/>
+        </p:nvPicPr>
+        <p:blipFill>
+          <a:blip r:embed="rId2" cstate="print">
+            <a:extLst>
+              <a:ext uri="{28A0092B-C50C-407E-A947-70E740481C1C}">
+                <a14:useLocalDpi xmlns:a14="http://schemas.microsoft.com/office/drawing/2010/main" val="0"/>
+              </a:ext>
+            </a:extLst>
+          </a:blip>
+          <a:stretch>
+            <a:fillRect/>
+          </a:stretch>
+        </p:blipFill>
+        <p:spPr>
+          <a:xfrm>
+            <a:off x="4198945" y="3351363"/>
+            <a:ext cx="3015337" cy="1969818"/>
+          </a:xfrm>
+          <a:prstGeom prst="rect">
+            <a:avLst/>
+          </a:prstGeom>
+        </p:spPr>
+      </p:pic>
+      <p:pic>
+        <p:nvPicPr>
+          <p:cNvPr id="4" name="Grafik 3"/>
+          <p:cNvPicPr>
+            <a:picLocks noChangeAspect="1"/>
+          </p:cNvPicPr>
+          <p:nvPr/>
+        </p:nvPicPr>
+        <p:blipFill>
+          <a:blip r:embed="rId3" cstate="print">
+            <a:extLst>
+              <a:ext uri="{28A0092B-C50C-407E-A947-70E740481C1C}">
+                <a14:useLocalDpi xmlns:a14="http://schemas.microsoft.com/office/drawing/2010/main" val="0"/>
+              </a:ext>
+            </a:extLst>
+          </a:blip>
+          <a:stretch>
+            <a:fillRect/>
+          </a:stretch>
+        </p:blipFill>
+        <p:spPr>
+          <a:xfrm>
+            <a:off x="71760" y="98971"/>
+            <a:ext cx="1514686" cy="576351"/>
+          </a:xfrm>
+          <a:prstGeom prst="rect">
+            <a:avLst/>
+          </a:prstGeom>
+        </p:spPr>
+      </p:pic>
+      <p:sp>
+        <p:nvSpPr>
+          <p:cNvPr id="5" name="Rechteck 4"/>
+          <p:cNvSpPr/>
+          <p:nvPr/>
+        </p:nvSpPr>
+        <p:spPr>
+          <a:xfrm>
+            <a:off x="7855336" y="5442795"/>
+            <a:ext cx="2225289" cy="227755"/>
+          </a:xfrm>
+          <a:prstGeom prst="rect">
+            <a:avLst/>
+          </a:prstGeom>
+        </p:spPr>
+        <p:txBody>
+          <a:bodyPr wrap="none">
+            <a:spAutoFit/>
+          </a:bodyPr>
+          <a:lstStyle/>
+          <a:p>
+            <a:pPr>
+              <a:lnSpc>
+                <a:spcPct val="88000"/>
+              </a:lnSpc>
+              <a:buClr>
+                <a:srgbClr val="666666"/>
+              </a:buClr>
+              <a:buSzPct val="75000"/>
+              <a:buFont typeface="StarSymbol" charset="0"/>
+              <a:buNone/>
+            </a:pPr>
+            <a:r>
+              <a:rPr lang="de-DE" altLang="de-DE" sz="1000" dirty="0" err="1">
+                <a:solidFill>
+                  <a:srgbClr val="FFFFFF"/>
+                </a:solidFill>
+                <a:latin typeface="Calibri" panose="020F0502020204030204" pitchFamily="34" charset="0"/>
+              </a:rPr>
+              <a:t>copyright</a:t>
+            </a:r>
+            <a:r>
+              <a:rPr lang="de-DE" altLang="de-DE" sz="1000" dirty="0">
+                <a:solidFill>
+                  <a:srgbClr val="FFFFFF"/>
+                </a:solidFill>
+                <a:latin typeface="Calibri" panose="020F0502020204030204" pitchFamily="34" charset="0"/>
+              </a:rPr>
+              <a:t> </a:t>
+            </a:r>
+            <a:r>
+              <a:rPr lang="de-DE" altLang="de-DE" sz="1000" dirty="0" err="1">
+                <a:solidFill>
+                  <a:srgbClr val="FFFFFF"/>
+                </a:solidFill>
+                <a:latin typeface="Calibri" panose="020F0502020204030204" pitchFamily="34" charset="0"/>
+              </a:rPr>
+              <a:t>by</a:t>
+            </a:r>
+            <a:r>
+              <a:rPr lang="de-DE" altLang="de-DE" sz="1000" dirty="0">
+                <a:solidFill>
+                  <a:srgbClr val="FFFFFF"/>
+                </a:solidFill>
+                <a:latin typeface="Calibri" panose="020F0502020204030204" pitchFamily="34" charset="0"/>
+              </a:rPr>
+              <a:t> </a:t>
+            </a:r>
+            <a:r>
+              <a:rPr lang="de-DE" altLang="de-DE" sz="1000" dirty="0" err="1">
+                <a:solidFill>
+                  <a:srgbClr val="FFFFFF"/>
+                </a:solidFill>
+                <a:latin typeface="Calibri" panose="020F0502020204030204" pitchFamily="34" charset="0"/>
+              </a:rPr>
+              <a:t>the</a:t>
+            </a:r>
+            <a:r>
+              <a:rPr lang="de-DE" altLang="de-DE" sz="1000" dirty="0">
+                <a:solidFill>
+                  <a:srgbClr val="FFFFFF"/>
+                </a:solidFill>
+                <a:latin typeface="Calibri" panose="020F0502020204030204" pitchFamily="34" charset="0"/>
+              </a:rPr>
+              <a:t> 3MF </a:t>
+            </a:r>
+            <a:r>
+              <a:rPr lang="de-DE" altLang="de-DE" sz="1000" dirty="0" err="1">
+                <a:solidFill>
+                  <a:srgbClr val="FFFFFF"/>
+                </a:solidFill>
+                <a:latin typeface="Calibri" panose="020F0502020204030204" pitchFamily="34" charset="0"/>
+              </a:rPr>
+              <a:t>Consortium</a:t>
+            </a:r>
+            <a:r>
+              <a:rPr lang="de-DE" altLang="de-DE" sz="1000" dirty="0">
+                <a:solidFill>
+                  <a:srgbClr val="FFFFFF"/>
+                </a:solidFill>
+                <a:latin typeface="Calibri" panose="020F0502020204030204" pitchFamily="34" charset="0"/>
+              </a:rPr>
+              <a:t> 2018</a:t>
+            </a:r>
+          </a:p>
+        </p:txBody>
+      </p:sp>
+      <p:sp>
+        <p:nvSpPr>
+          <p:cNvPr id="6" name="Text Box 1"/>
+          <p:cNvSpPr txBox="1">
+            <a:spLocks noChangeArrowheads="1"/>
+          </p:cNvSpPr>
+          <p:nvPr/>
+        </p:nvSpPr>
+        <p:spPr bwMode="auto">
+          <a:xfrm>
+            <a:off x="2592040" y="314995"/>
+            <a:ext cx="6696744" cy="535584"/>
+          </a:xfrm>
+          <a:prstGeom prst="rect">
+            <a:avLst/>
+          </a:prstGeom>
+          <a:noFill/>
+          <a:ln>
+            <a:noFill/>
+          </a:ln>
+          <a:effectLst/>
+          <a:extLst>
+            <a:ext uri="{909E8E84-426E-40DD-AFC4-6F175D3DCCD1}">
+              <a14:hiddenFill xmlns:a14="http://schemas.microsoft.com/office/drawing/2010/main">
+                <a:solidFill>
+                  <a:srgbClr val="FFFFFF"/>
+                </a:solidFill>
+              </a14:hiddenFill>
+            </a:ext>
+            <a:ext uri="{91240B29-F687-4F45-9708-019B960494DF}">
+              <a14:hiddenLine xmlns:a14="http://schemas.microsoft.com/office/drawing/2010/main" w="9525" cap="flat">
+                <a:solidFill>
+                  <a:srgbClr val="000000"/>
+                </a:solidFill>
+                <a:round/>
+                <a:headEnd/>
+                <a:tailEnd/>
+              </a14:hiddenLine>
+            </a:ext>
+            <a:ext uri="{AF507438-7753-43E0-B8FC-AC1667EBCBE1}">
+              <a14:hiddenEffects xmlns:a14="http://schemas.microsoft.com/office/drawing/2010/main">
+                <a:effectLst>
+                  <a:outerShdw dist="35921" dir="2700000" algn="ctr" rotWithShape="0">
+                    <a:srgbClr val="808080"/>
+                  </a:outerShdw>
+                </a:effectLst>
+              </a14:hiddenEffects>
+            </a:ext>
+          </a:extLst>
+        </p:spPr>
+        <p:txBody>
+          <a:bodyPr lIns="90000" tIns="45000" rIns="90000" bIns="45000"/>
+          <a:lstStyle>
+            <a:lvl1pPr>
+              <a:tabLst>
+                <a:tab pos="449263" algn="l"/>
+                <a:tab pos="898525" algn="l"/>
+                <a:tab pos="1347788" algn="l"/>
+                <a:tab pos="1797050" algn="l"/>
+                <a:tab pos="2246313" algn="l"/>
+                <a:tab pos="2695575" algn="l"/>
+                <a:tab pos="3144838" algn="l"/>
+                <a:tab pos="3594100" algn="l"/>
+                <a:tab pos="4043363" algn="l"/>
+                <a:tab pos="4492625" algn="l"/>
+                <a:tab pos="4941888" algn="l"/>
+                <a:tab pos="5391150" algn="l"/>
+                <a:tab pos="5840413" algn="l"/>
+              </a:tabLst>
+              <a:defRPr>
+                <a:solidFill>
+                  <a:srgbClr val="000000"/>
+                </a:solidFill>
+                <a:latin typeface="Arial" panose="020B0604020202020204" pitchFamily="34" charset="0"/>
+                <a:ea typeface="Microsoft YaHei" panose="020B0503020204020204" pitchFamily="34" charset="-122"/>
+              </a:defRPr>
+            </a:lvl1pPr>
+            <a:lvl2pPr>
+              <a:tabLst>
+                <a:tab pos="449263" algn="l"/>
+                <a:tab pos="898525" algn="l"/>
+                <a:tab pos="1347788" algn="l"/>
+                <a:tab pos="1797050" algn="l"/>
+                <a:tab pos="2246313" algn="l"/>
+                <a:tab pos="2695575" algn="l"/>
+                <a:tab pos="3144838" algn="l"/>
+                <a:tab pos="3594100" algn="l"/>
+                <a:tab pos="4043363" algn="l"/>
+                <a:tab pos="4492625" algn="l"/>
+                <a:tab pos="4941888" algn="l"/>
+                <a:tab pos="5391150" algn="l"/>
+                <a:tab pos="5840413" algn="l"/>
+              </a:tabLst>
+              <a:defRPr>
+                <a:solidFill>
+                  <a:srgbClr val="000000"/>
+                </a:solidFill>
+                <a:latin typeface="Arial" panose="020B0604020202020204" pitchFamily="34" charset="0"/>
+                <a:ea typeface="Microsoft YaHei" panose="020B0503020204020204" pitchFamily="34" charset="-122"/>
+              </a:defRPr>
+            </a:lvl2pPr>
+            <a:lvl3pPr>
+              <a:tabLst>
+                <a:tab pos="449263" algn="l"/>
+                <a:tab pos="898525" algn="l"/>
+                <a:tab pos="1347788" algn="l"/>
+                <a:tab pos="1797050" algn="l"/>
+                <a:tab pos="2246313" algn="l"/>
+                <a:tab pos="2695575" algn="l"/>
+                <a:tab pos="3144838" algn="l"/>
+                <a:tab pos="3594100" algn="l"/>
+                <a:tab pos="4043363" algn="l"/>
+                <a:tab pos="4492625" algn="l"/>
+                <a:tab pos="4941888" algn="l"/>
+                <a:tab pos="5391150" algn="l"/>
+                <a:tab pos="5840413" algn="l"/>
+              </a:tabLst>
+              <a:defRPr>
+                <a:solidFill>
+                  <a:srgbClr val="000000"/>
+                </a:solidFill>
+                <a:latin typeface="Arial" panose="020B0604020202020204" pitchFamily="34" charset="0"/>
+                <a:ea typeface="Microsoft YaHei" panose="020B0503020204020204" pitchFamily="34" charset="-122"/>
+              </a:defRPr>
+            </a:lvl3pPr>
+            <a:lvl4pPr>
+              <a:tabLst>
+                <a:tab pos="449263" algn="l"/>
+                <a:tab pos="898525" algn="l"/>
+                <a:tab pos="1347788" algn="l"/>
+                <a:tab pos="1797050" algn="l"/>
+                <a:tab pos="2246313" algn="l"/>
+                <a:tab pos="2695575" algn="l"/>
+                <a:tab pos="3144838" algn="l"/>
+                <a:tab pos="3594100" algn="l"/>
+                <a:tab pos="4043363" algn="l"/>
+                <a:tab pos="4492625" algn="l"/>
+                <a:tab pos="4941888" algn="l"/>
+                <a:tab pos="5391150" algn="l"/>
+                <a:tab pos="5840413" algn="l"/>
+              </a:tabLst>
+              <a:defRPr>
+                <a:solidFill>
+                  <a:srgbClr val="000000"/>
+                </a:solidFill>
+                <a:latin typeface="Arial" panose="020B0604020202020204" pitchFamily="34" charset="0"/>
+                <a:ea typeface="Microsoft YaHei" panose="020B0503020204020204" pitchFamily="34" charset="-122"/>
+              </a:defRPr>
+            </a:lvl4pPr>
+            <a:lvl5pPr>
+              <a:tabLst>
+                <a:tab pos="449263" algn="l"/>
+                <a:tab pos="898525" algn="l"/>
+                <a:tab pos="1347788" algn="l"/>
+                <a:tab pos="1797050" algn="l"/>
+                <a:tab pos="2246313" algn="l"/>
+                <a:tab pos="2695575" algn="l"/>
+                <a:tab pos="3144838" algn="l"/>
+                <a:tab pos="3594100" algn="l"/>
+                <a:tab pos="4043363" algn="l"/>
+                <a:tab pos="4492625" algn="l"/>
+                <a:tab pos="4941888" algn="l"/>
+                <a:tab pos="5391150" algn="l"/>
+                <a:tab pos="5840413" algn="l"/>
+              </a:tabLst>
+              <a:defRPr>
+                <a:solidFill>
+                  <a:srgbClr val="000000"/>
+                </a:solidFill>
+                <a:latin typeface="Arial" panose="020B0604020202020204" pitchFamily="34" charset="0"/>
+                <a:ea typeface="Microsoft YaHei" panose="020B0503020204020204" pitchFamily="34" charset="-122"/>
+              </a:defRPr>
+            </a:lvl5pPr>
+            <a:lvl6pPr marL="2514600" indent="-228600" defTabSz="449263" fontAlgn="base" hangingPunct="0">
+              <a:lnSpc>
+                <a:spcPct val="93000"/>
+              </a:lnSpc>
+              <a:spcBef>
+                <a:spcPct val="0"/>
+              </a:spcBef>
+              <a:spcAft>
+                <a:spcPct val="0"/>
+              </a:spcAft>
+              <a:buClr>
+                <a:srgbClr val="000000"/>
+              </a:buClr>
+              <a:buSzPct val="100000"/>
+              <a:buFont typeface="Times New Roman" panose="02020603050405020304" pitchFamily="18" charset="0"/>
+              <a:tabLst>
+                <a:tab pos="449263" algn="l"/>
+                <a:tab pos="898525" algn="l"/>
+                <a:tab pos="1347788" algn="l"/>
+                <a:tab pos="1797050" algn="l"/>
+                <a:tab pos="2246313" algn="l"/>
+                <a:tab pos="2695575" algn="l"/>
+                <a:tab pos="3144838" algn="l"/>
+                <a:tab pos="3594100" algn="l"/>
+                <a:tab pos="4043363" algn="l"/>
+                <a:tab pos="4492625" algn="l"/>
+                <a:tab pos="4941888" algn="l"/>
+                <a:tab pos="5391150" algn="l"/>
+                <a:tab pos="5840413" algn="l"/>
+              </a:tabLst>
+              <a:defRPr>
+                <a:solidFill>
+                  <a:srgbClr val="000000"/>
+                </a:solidFill>
+                <a:latin typeface="Arial" panose="020B0604020202020204" pitchFamily="34" charset="0"/>
+                <a:ea typeface="Microsoft YaHei" panose="020B0503020204020204" pitchFamily="34" charset="-122"/>
+              </a:defRPr>
+            </a:lvl6pPr>
+            <a:lvl7pPr marL="2971800" indent="-228600" defTabSz="449263" fontAlgn="base" hangingPunct="0">
+              <a:lnSpc>
+                <a:spcPct val="93000"/>
+              </a:lnSpc>
+              <a:spcBef>
+                <a:spcPct val="0"/>
+              </a:spcBef>
+              <a:spcAft>
+                <a:spcPct val="0"/>
+              </a:spcAft>
+              <a:buClr>
+                <a:srgbClr val="000000"/>
+              </a:buClr>
+              <a:buSzPct val="100000"/>
+              <a:buFont typeface="Times New Roman" panose="02020603050405020304" pitchFamily="18" charset="0"/>
+              <a:tabLst>
+                <a:tab pos="449263" algn="l"/>
+                <a:tab pos="898525" algn="l"/>
+                <a:tab pos="1347788" algn="l"/>
+                <a:tab pos="1797050" algn="l"/>
+                <a:tab pos="2246313" algn="l"/>
+                <a:tab pos="2695575" algn="l"/>
+                <a:tab pos="3144838" algn="l"/>
+                <a:tab pos="3594100" algn="l"/>
+                <a:tab pos="4043363" algn="l"/>
+                <a:tab pos="4492625" algn="l"/>
+                <a:tab pos="4941888" algn="l"/>
+                <a:tab pos="5391150" algn="l"/>
+                <a:tab pos="5840413" algn="l"/>
+              </a:tabLst>
+              <a:defRPr>
+                <a:solidFill>
+                  <a:srgbClr val="000000"/>
+                </a:solidFill>
+                <a:latin typeface="Arial" panose="020B0604020202020204" pitchFamily="34" charset="0"/>
+                <a:ea typeface="Microsoft YaHei" panose="020B0503020204020204" pitchFamily="34" charset="-122"/>
+              </a:defRPr>
+            </a:lvl7pPr>
+            <a:lvl8pPr marL="3429000" indent="-228600" defTabSz="449263" fontAlgn="base" hangingPunct="0">
+              <a:lnSpc>
+                <a:spcPct val="93000"/>
+              </a:lnSpc>
+              <a:spcBef>
+                <a:spcPct val="0"/>
+              </a:spcBef>
+              <a:spcAft>
+                <a:spcPct val="0"/>
+              </a:spcAft>
+              <a:buClr>
+                <a:srgbClr val="000000"/>
+              </a:buClr>
+              <a:buSzPct val="100000"/>
+              <a:buFont typeface="Times New Roman" panose="02020603050405020304" pitchFamily="18" charset="0"/>
+              <a:tabLst>
+                <a:tab pos="449263" algn="l"/>
+                <a:tab pos="898525" algn="l"/>
+                <a:tab pos="1347788" algn="l"/>
+                <a:tab pos="1797050" algn="l"/>
+                <a:tab pos="2246313" algn="l"/>
+                <a:tab pos="2695575" algn="l"/>
+                <a:tab pos="3144838" algn="l"/>
+                <a:tab pos="3594100" algn="l"/>
+                <a:tab pos="4043363" algn="l"/>
+                <a:tab pos="4492625" algn="l"/>
+                <a:tab pos="4941888" algn="l"/>
+                <a:tab pos="5391150" algn="l"/>
+                <a:tab pos="5840413" algn="l"/>
+              </a:tabLst>
+              <a:defRPr>
+                <a:solidFill>
+                  <a:srgbClr val="000000"/>
+                </a:solidFill>
+                <a:latin typeface="Arial" panose="020B0604020202020204" pitchFamily="34" charset="0"/>
+                <a:ea typeface="Microsoft YaHei" panose="020B0503020204020204" pitchFamily="34" charset="-122"/>
+              </a:defRPr>
+            </a:lvl8pPr>
+            <a:lvl9pPr marL="3886200" indent="-228600" defTabSz="449263" fontAlgn="base" hangingPunct="0">
+              <a:lnSpc>
+                <a:spcPct val="93000"/>
+              </a:lnSpc>
+              <a:spcBef>
+                <a:spcPct val="0"/>
+              </a:spcBef>
+              <a:spcAft>
+                <a:spcPct val="0"/>
+              </a:spcAft>
+              <a:buClr>
+                <a:srgbClr val="000000"/>
+              </a:buClr>
+              <a:buSzPct val="100000"/>
+              <a:buFont typeface="Times New Roman" panose="02020603050405020304" pitchFamily="18" charset="0"/>
+              <a:tabLst>
+                <a:tab pos="449263" algn="l"/>
+                <a:tab pos="898525" algn="l"/>
+                <a:tab pos="1347788" algn="l"/>
+                <a:tab pos="1797050" algn="l"/>
+                <a:tab pos="2246313" algn="l"/>
+                <a:tab pos="2695575" algn="l"/>
+                <a:tab pos="3144838" algn="l"/>
+                <a:tab pos="3594100" algn="l"/>
+                <a:tab pos="4043363" algn="l"/>
+                <a:tab pos="4492625" algn="l"/>
+                <a:tab pos="4941888" algn="l"/>
+                <a:tab pos="5391150" algn="l"/>
+                <a:tab pos="5840413" algn="l"/>
+              </a:tabLst>
+              <a:defRPr>
+                <a:solidFill>
+                  <a:srgbClr val="000000"/>
+                </a:solidFill>
+                <a:latin typeface="Arial" panose="020B0604020202020204" pitchFamily="34" charset="0"/>
+                <a:ea typeface="Microsoft YaHei" panose="020B0503020204020204" pitchFamily="34" charset="-122"/>
+              </a:defRPr>
+            </a:lvl9pPr>
+          </a:lstStyle>
+          <a:p>
+            <a:pPr algn="r">
+              <a:lnSpc>
+                <a:spcPct val="88000"/>
+              </a:lnSpc>
+            </a:pPr>
+            <a:r>
+              <a:rPr lang="de-DE" altLang="de-DE" sz="2800" b="1" dirty="0">
+                <a:solidFill>
+                  <a:srgbClr val="666666"/>
+                </a:solidFill>
+                <a:latin typeface="Calibri" panose="020F0502020204030204" pitchFamily="34" charset="0"/>
+              </a:rPr>
+              <a:t>Building </a:t>
+            </a:r>
+            <a:r>
+              <a:rPr lang="de-DE" altLang="de-DE" sz="2800" b="1" dirty="0" err="1">
+                <a:solidFill>
+                  <a:srgbClr val="666666"/>
+                </a:solidFill>
+                <a:latin typeface="Calibri" panose="020F0502020204030204" pitchFamily="34" charset="0"/>
+              </a:rPr>
+              <a:t>blocks</a:t>
+            </a:r>
+            <a:endParaRPr lang="de-DE" altLang="de-DE" sz="1400" b="1" dirty="0">
+              <a:solidFill>
+                <a:srgbClr val="666666"/>
+              </a:solidFill>
+              <a:latin typeface="Calibri" panose="020F0502020204030204" pitchFamily="34" charset="0"/>
+            </a:endParaRPr>
+          </a:p>
+        </p:txBody>
+      </p:sp>
+      <p:sp>
+        <p:nvSpPr>
+          <p:cNvPr id="7" name="Textfeld 6"/>
+          <p:cNvSpPr txBox="1"/>
+          <p:nvPr/>
+        </p:nvSpPr>
+        <p:spPr>
+          <a:xfrm>
+            <a:off x="431800" y="913602"/>
+            <a:ext cx="7704856" cy="1552220"/>
+          </a:xfrm>
+          <a:prstGeom prst="rect">
+            <a:avLst/>
+          </a:prstGeom>
+          <a:noFill/>
+        </p:spPr>
+        <p:txBody>
+          <a:bodyPr wrap="square" rtlCol="0">
+            <a:spAutoFit/>
+          </a:bodyPr>
+          <a:lstStyle/>
+          <a:p>
+            <a:r>
+              <a:rPr lang="en-US" b="1" dirty="0">
+                <a:latin typeface="Calibri" panose="020F0502020204030204" pitchFamily="34" charset="0"/>
+              </a:rPr>
+              <a:t>3. Evaluate manipulated functions in 3MF world</a:t>
+            </a:r>
+          </a:p>
+          <a:p>
+            <a:endParaRPr lang="en-GB" sz="1400" dirty="0">
+              <a:solidFill>
+                <a:srgbClr val="666666"/>
+              </a:solidFill>
+              <a:latin typeface="Calibri" panose="020F0502020204030204" pitchFamily="34" charset="0"/>
+            </a:endParaRPr>
+          </a:p>
+          <a:p>
+            <a:pPr marL="342900" indent="-342900">
+              <a:buAutoNum type="arabicPeriod"/>
+            </a:pPr>
+            <a:r>
+              <a:rPr lang="en-GB" sz="1400" dirty="0">
+                <a:latin typeface="Calibri" panose="020F0502020204030204" pitchFamily="34" charset="0"/>
+              </a:rPr>
+              <a:t>Object boundary (</a:t>
+            </a:r>
+            <a:r>
+              <a:rPr lang="en-GB" sz="1400" dirty="0" err="1">
+                <a:latin typeface="Calibri" panose="020F0502020204030204" pitchFamily="34" charset="0"/>
+              </a:rPr>
+              <a:t>Levelset</a:t>
+            </a:r>
+            <a:r>
+              <a:rPr lang="en-GB" sz="1400" dirty="0">
+                <a:latin typeface="Calibri" panose="020F0502020204030204" pitchFamily="34" charset="0"/>
+              </a:rPr>
+              <a:t>)</a:t>
+            </a:r>
+          </a:p>
+          <a:p>
+            <a:pPr marL="342900" indent="-342900">
+              <a:buAutoNum type="arabicPeriod"/>
+            </a:pPr>
+            <a:r>
+              <a:rPr lang="en-GB" sz="1400" dirty="0">
+                <a:latin typeface="Calibri" panose="020F0502020204030204" pitchFamily="34" charset="0"/>
+              </a:rPr>
+              <a:t>Spatially varying </a:t>
+            </a:r>
+            <a:r>
+              <a:rPr lang="en-GB" sz="1400" dirty="0" err="1">
+                <a:latin typeface="Calibri" panose="020F0502020204030204" pitchFamily="34" charset="0"/>
+              </a:rPr>
+              <a:t>Color</a:t>
+            </a:r>
+            <a:endParaRPr lang="en-GB" sz="1400" dirty="0">
+              <a:latin typeface="Calibri" panose="020F0502020204030204" pitchFamily="34" charset="0"/>
+            </a:endParaRPr>
+          </a:p>
+          <a:p>
+            <a:pPr marL="342900" indent="-342900">
+              <a:buAutoNum type="arabicPeriod"/>
+            </a:pPr>
+            <a:r>
+              <a:rPr lang="en-GB" sz="1400" dirty="0">
+                <a:latin typeface="Calibri" panose="020F0502020204030204" pitchFamily="34" charset="0"/>
+              </a:rPr>
+              <a:t>Material composition</a:t>
+            </a:r>
+          </a:p>
+          <a:p>
+            <a:pPr marL="342900" indent="-342900">
+              <a:buAutoNum type="arabicPeriod"/>
+            </a:pPr>
+            <a:r>
+              <a:rPr lang="en-GB" sz="1400" dirty="0">
+                <a:latin typeface="Calibri" panose="020F0502020204030204" pitchFamily="34" charset="0"/>
+              </a:rPr>
+              <a:t>High level (arbitrary) properties</a:t>
+            </a:r>
+          </a:p>
+          <a:p>
+            <a:pPr marL="285750" indent="-285750">
+              <a:buFontTx/>
+              <a:buChar char="-"/>
+            </a:pPr>
+            <a:endParaRPr lang="en-GB" sz="1400" dirty="0">
+              <a:latin typeface="Calibri" panose="020F0502020204030204" pitchFamily="34" charset="0"/>
+            </a:endParaRPr>
+          </a:p>
+        </p:txBody>
+      </p:sp>
+      <p:pic>
+        <p:nvPicPr>
+          <p:cNvPr id="9" name="Picture 8">
+            <a:extLst>
+              <a:ext uri="{FF2B5EF4-FFF2-40B4-BE49-F238E27FC236}">
+                <a16:creationId xmlns:a16="http://schemas.microsoft.com/office/drawing/2014/main" id="{19B3D71A-97C6-4E67-B9AA-063BF54DD5C7}"/>
+              </a:ext>
+            </a:extLst>
+          </p:cNvPr>
+          <p:cNvPicPr>
+            <a:picLocks noChangeAspect="1"/>
+          </p:cNvPicPr>
+          <p:nvPr/>
+        </p:nvPicPr>
+        <p:blipFill>
+          <a:blip r:embed="rId4" cstate="print">
+            <a:extLst>
+              <a:ext uri="{28A0092B-C50C-407E-A947-70E740481C1C}">
+                <a14:useLocalDpi xmlns:a14="http://schemas.microsoft.com/office/drawing/2010/main" val="0"/>
+              </a:ext>
+            </a:extLst>
+          </a:blip>
+          <a:stretch>
+            <a:fillRect/>
+          </a:stretch>
+        </p:blipFill>
+        <p:spPr>
+          <a:xfrm>
+            <a:off x="4176216" y="1354156"/>
+            <a:ext cx="3038068" cy="1969819"/>
+          </a:xfrm>
+          <a:prstGeom prst="rect">
+            <a:avLst/>
+          </a:prstGeom>
+        </p:spPr>
+      </p:pic>
+      <p:pic>
+        <p:nvPicPr>
+          <p:cNvPr id="3" name="Picture 2">
+            <a:extLst>
+              <a:ext uri="{FF2B5EF4-FFF2-40B4-BE49-F238E27FC236}">
+                <a16:creationId xmlns:a16="http://schemas.microsoft.com/office/drawing/2014/main" id="{19AEA2F6-5BD2-4B61-B859-20B4FA410D40}"/>
+              </a:ext>
+            </a:extLst>
+          </p:cNvPr>
+          <p:cNvPicPr>
+            <a:picLocks noChangeAspect="1"/>
+          </p:cNvPicPr>
+          <p:nvPr/>
+        </p:nvPicPr>
+        <p:blipFill>
+          <a:blip r:embed="rId5">
+            <a:extLst>
+              <a:ext uri="{28A0092B-C50C-407E-A947-70E740481C1C}">
+                <a14:useLocalDpi xmlns:a14="http://schemas.microsoft.com/office/drawing/2010/main" val="0"/>
+              </a:ext>
+            </a:extLst>
+          </a:blip>
+          <a:stretch>
+            <a:fillRect/>
+          </a:stretch>
+        </p:blipFill>
+        <p:spPr>
+          <a:xfrm>
+            <a:off x="575816" y="2473305"/>
+            <a:ext cx="3833192" cy="2331922"/>
+          </a:xfrm>
+          <a:prstGeom prst="rect">
+            <a:avLst/>
+          </a:prstGeom>
+        </p:spPr>
+      </p:pic>
+      <p:pic>
+        <p:nvPicPr>
+          <p:cNvPr id="10" name="Picture 9">
+            <a:extLst>
+              <a:ext uri="{FF2B5EF4-FFF2-40B4-BE49-F238E27FC236}">
+                <a16:creationId xmlns:a16="http://schemas.microsoft.com/office/drawing/2014/main" id="{330A17B8-1FF8-45B7-85B8-C120C854BE3A}"/>
+              </a:ext>
+            </a:extLst>
+          </p:cNvPr>
+          <p:cNvPicPr>
+            <a:picLocks noChangeAspect="1"/>
+          </p:cNvPicPr>
+          <p:nvPr/>
+        </p:nvPicPr>
+        <p:blipFill>
+          <a:blip r:embed="rId6" cstate="print">
+            <a:extLst>
+              <a:ext uri="{28A0092B-C50C-407E-A947-70E740481C1C}">
+                <a14:useLocalDpi xmlns:a14="http://schemas.microsoft.com/office/drawing/2010/main" val="0"/>
+              </a:ext>
+            </a:extLst>
+          </a:blip>
+          <a:stretch>
+            <a:fillRect/>
+          </a:stretch>
+        </p:blipFill>
+        <p:spPr>
+          <a:xfrm>
+            <a:off x="7214283" y="1354156"/>
+            <a:ext cx="3015337" cy="1969818"/>
+          </a:xfrm>
+          <a:prstGeom prst="rect">
+            <a:avLst/>
+          </a:prstGeom>
+        </p:spPr>
+      </p:pic>
+      <p:sp>
+        <p:nvSpPr>
+          <p:cNvPr id="12" name="TextBox 11">
+            <a:extLst>
+              <a:ext uri="{FF2B5EF4-FFF2-40B4-BE49-F238E27FC236}">
+                <a16:creationId xmlns:a16="http://schemas.microsoft.com/office/drawing/2014/main" id="{4CDC52F8-E3A7-4B4A-9FFD-D9316E0BADCB}"/>
+              </a:ext>
+            </a:extLst>
+          </p:cNvPr>
+          <p:cNvSpPr txBox="1"/>
+          <p:nvPr/>
+        </p:nvSpPr>
+        <p:spPr>
+          <a:xfrm>
+            <a:off x="4706270" y="3530263"/>
+            <a:ext cx="766090" cy="221151"/>
+          </a:xfrm>
+          <a:prstGeom prst="rect">
+            <a:avLst/>
+          </a:prstGeom>
+          <a:noFill/>
+        </p:spPr>
+        <p:txBody>
+          <a:bodyPr wrap="square" rtlCol="0">
+            <a:spAutoFit/>
+          </a:bodyPr>
+          <a:lstStyle/>
+          <a:p>
+            <a:r>
+              <a:rPr lang="en-GB" sz="900" dirty="0">
+                <a:solidFill>
+                  <a:srgbClr val="FF0000"/>
+                </a:solidFill>
+              </a:rPr>
+              <a:t>Channel 1</a:t>
+            </a:r>
+            <a:endParaRPr lang="de-DE" sz="900" dirty="0">
+              <a:solidFill>
+                <a:srgbClr val="FF0000"/>
+              </a:solidFill>
+            </a:endParaRPr>
+          </a:p>
+        </p:txBody>
+      </p:sp>
+      <p:sp>
+        <p:nvSpPr>
+          <p:cNvPr id="13" name="TextBox 12">
+            <a:extLst>
+              <a:ext uri="{FF2B5EF4-FFF2-40B4-BE49-F238E27FC236}">
+                <a16:creationId xmlns:a16="http://schemas.microsoft.com/office/drawing/2014/main" id="{C9024532-8533-4BCF-8968-A32BA98F563E}"/>
+              </a:ext>
+            </a:extLst>
+          </p:cNvPr>
+          <p:cNvSpPr txBox="1"/>
+          <p:nvPr/>
+        </p:nvSpPr>
+        <p:spPr>
+          <a:xfrm>
+            <a:off x="6120432" y="3530263"/>
+            <a:ext cx="766090" cy="221151"/>
+          </a:xfrm>
+          <a:prstGeom prst="rect">
+            <a:avLst/>
+          </a:prstGeom>
+          <a:noFill/>
+        </p:spPr>
+        <p:txBody>
+          <a:bodyPr wrap="square" rtlCol="0">
+            <a:spAutoFit/>
+          </a:bodyPr>
+          <a:lstStyle/>
+          <a:p>
+            <a:r>
+              <a:rPr lang="en-GB" sz="900" dirty="0">
+                <a:solidFill>
+                  <a:srgbClr val="FF0000"/>
+                </a:solidFill>
+              </a:rPr>
+              <a:t>Channel 2</a:t>
+            </a:r>
+            <a:endParaRPr lang="de-DE" sz="900" dirty="0">
+              <a:solidFill>
+                <a:srgbClr val="FF0000"/>
+              </a:solidFill>
+            </a:endParaRPr>
+          </a:p>
+        </p:txBody>
+      </p:sp>
+      <p:pic>
+        <p:nvPicPr>
+          <p:cNvPr id="16" name="Picture 15">
+            <a:extLst>
+              <a:ext uri="{FF2B5EF4-FFF2-40B4-BE49-F238E27FC236}">
+                <a16:creationId xmlns:a16="http://schemas.microsoft.com/office/drawing/2014/main" id="{3FF1F2BE-7E96-4221-93D8-DE73606788A0}"/>
+              </a:ext>
+            </a:extLst>
+          </p:cNvPr>
+          <p:cNvPicPr>
+            <a:picLocks noChangeAspect="1"/>
+          </p:cNvPicPr>
+          <p:nvPr/>
+        </p:nvPicPr>
+        <p:blipFill>
+          <a:blip r:embed="rId7" cstate="print">
+            <a:extLst>
+              <a:ext uri="{28A0092B-C50C-407E-A947-70E740481C1C}">
+                <a14:useLocalDpi xmlns:a14="http://schemas.microsoft.com/office/drawing/2010/main" val="0"/>
+              </a:ext>
+            </a:extLst>
+          </a:blip>
+          <a:stretch>
+            <a:fillRect/>
+          </a:stretch>
+        </p:blipFill>
+        <p:spPr>
+          <a:xfrm>
+            <a:off x="7201325" y="3351361"/>
+            <a:ext cx="3015336" cy="1969817"/>
+          </a:xfrm>
+          <a:prstGeom prst="rect">
+            <a:avLst/>
+          </a:prstGeom>
+        </p:spPr>
+      </p:pic>
+    </p:spTree>
+    <p:extLst>
+      <p:ext uri="{BB962C8B-B14F-4D97-AF65-F5344CB8AC3E}">
+        <p14:creationId xmlns:p14="http://schemas.microsoft.com/office/powerpoint/2010/main" val="221445344"/>
+      </p:ext>
+    </p:extLst>
+  </p:cSld>
+  <p:clrMapOvr>
+    <a:masterClrMapping/>
+  </p:clrMapOvr>
+</p:sld>
+</file>
+
+<file path=ppt/slides/slide15.xml><?xml version="1.0" encoding="utf-8"?>
+<p:sld xmlns:a="http://schemas.openxmlformats.org/drawingml/2006/main" xmlns:r="http://schemas.openxmlformats.org/officeDocument/2006/relationships" xmlns:p="http://schemas.openxmlformats.org/presentationml/2006/main">
+  <p:cSld>
+    <p:spTree>
+      <p:nvGrpSpPr>
+        <p:cNvPr id="1" name=""/>
+        <p:cNvGrpSpPr/>
+        <p:nvPr/>
+      </p:nvGrpSpPr>
+      <p:grpSpPr>
+        <a:xfrm>
+          <a:off x="0" y="0"/>
+          <a:ext cx="0" cy="0"/>
+          <a:chOff x="0" y="0"/>
+          <a:chExt cx="0" cy="0"/>
+        </a:xfrm>
+      </p:grpSpPr>
+      <p:pic>
+        <p:nvPicPr>
           <p:cNvPr id="4" name="Grafik 3"/>
           <p:cNvPicPr>
             <a:picLocks noChangeAspect="1"/>
@@ -9320,7 +10469,7 @@
 </p:sld>
 </file>
 
-<file path=ppt/slides/slide15.xml><?xml version="1.0" encoding="utf-8"?>
+<file path=ppt/slides/slide16.xml><?xml version="1.0" encoding="utf-8"?>
 <p:sld xmlns:a="http://schemas.openxmlformats.org/drawingml/2006/main" xmlns:r="http://schemas.openxmlformats.org/officeDocument/2006/relationships" xmlns:p="http://schemas.openxmlformats.org/presentationml/2006/main">
   <p:cSld>
     <p:spTree>
@@ -9339,6 +10488,42 @@
       </p:grpSpPr>
       <p:pic>
         <p:nvPicPr>
+          <p:cNvPr id="8" name="Picture 7">
+            <a:extLst>
+              <a:ext uri="{FF2B5EF4-FFF2-40B4-BE49-F238E27FC236}">
+                <a16:creationId xmlns:a16="http://schemas.microsoft.com/office/drawing/2014/main" id="{369B6CDC-BCB8-44E8-A0DE-072E07230AB4}"/>
+              </a:ext>
+            </a:extLst>
+          </p:cNvPr>
+          <p:cNvPicPr>
+            <a:picLocks noChangeAspect="1"/>
+          </p:cNvPicPr>
+          <p:nvPr/>
+        </p:nvPicPr>
+        <p:blipFill>
+          <a:blip r:embed="rId2">
+            <a:extLst>
+              <a:ext uri="{28A0092B-C50C-407E-A947-70E740481C1C}">
+                <a14:useLocalDpi xmlns:a14="http://schemas.microsoft.com/office/drawing/2010/main" val="0"/>
+              </a:ext>
+            </a:extLst>
+          </a:blip>
+          <a:stretch>
+            <a:fillRect/>
+          </a:stretch>
+        </p:blipFill>
+        <p:spPr>
+          <a:xfrm>
+            <a:off x="5068728" y="1664320"/>
+            <a:ext cx="5597810" cy="3656861"/>
+          </a:xfrm>
+          <a:prstGeom prst="rect">
+            <a:avLst/>
+          </a:prstGeom>
+        </p:spPr>
+      </p:pic>
+      <p:pic>
+        <p:nvPicPr>
           <p:cNvPr id="2" name="Picture 1">
             <a:extLst>
               <a:ext uri="{FF2B5EF4-FFF2-40B4-BE49-F238E27FC236}">
@@ -9352,7 +10537,7 @@
           <p:nvPr/>
         </p:nvPicPr>
         <p:blipFill>
-          <a:blip r:embed="rId2"/>
+          <a:blip r:embed="rId3"/>
           <a:stretch>
             <a:fillRect/>
           </a:stretch>
@@ -9376,7 +10561,7 @@
           <p:nvPr/>
         </p:nvPicPr>
         <p:blipFill>
-          <a:blip r:embed="rId3" cstate="print">
+          <a:blip r:embed="rId4" cstate="print">
             <a:extLst>
               <a:ext uri="{28A0092B-C50C-407E-A947-70E740481C1C}">
                 <a14:useLocalDpi xmlns:a14="http://schemas.microsoft.com/office/drawing/2010/main" val="0"/>
@@ -9504,42 +10689,6 @@
           </a:p>
         </p:txBody>
       </p:sp>
-      <p:pic>
-        <p:nvPicPr>
-          <p:cNvPr id="9" name="Picture 8">
-            <a:extLst>
-              <a:ext uri="{FF2B5EF4-FFF2-40B4-BE49-F238E27FC236}">
-                <a16:creationId xmlns:a16="http://schemas.microsoft.com/office/drawing/2014/main" id="{19B3D71A-97C6-4E67-B9AA-063BF54DD5C7}"/>
-              </a:ext>
-            </a:extLst>
-          </p:cNvPr>
-          <p:cNvPicPr>
-            <a:picLocks noChangeAspect="1"/>
-          </p:cNvPicPr>
-          <p:nvPr/>
-        </p:nvPicPr>
-        <p:blipFill>
-          <a:blip r:embed="rId4">
-            <a:extLst>
-              <a:ext uri="{28A0092B-C50C-407E-A947-70E740481C1C}">
-                <a14:useLocalDpi xmlns:a14="http://schemas.microsoft.com/office/drawing/2010/main" val="0"/>
-              </a:ext>
-            </a:extLst>
-          </a:blip>
-          <a:stretch>
-            <a:fillRect/>
-          </a:stretch>
-        </p:blipFill>
-        <p:spPr>
-          <a:xfrm>
-            <a:off x="5460671" y="1664320"/>
-            <a:ext cx="5640004" cy="3656861"/>
-          </a:xfrm>
-          <a:prstGeom prst="rect">
-            <a:avLst/>
-          </a:prstGeom>
-        </p:spPr>
-      </p:pic>
       <p:sp>
         <p:nvSpPr>
           <p:cNvPr id="11" name="Text Box 1">
@@ -10002,7 +11151,7 @@
 </p:sld>
 </file>
 
-<file path=ppt/slides/slide16.xml><?xml version="1.0" encoding="utf-8"?>
+<file path=ppt/slides/slide17.xml><?xml version="1.0" encoding="utf-8"?>
 <p:sld xmlns:a="http://schemas.openxmlformats.org/drawingml/2006/main" xmlns:r="http://schemas.openxmlformats.org/officeDocument/2006/relationships" xmlns:p="http://schemas.openxmlformats.org/presentationml/2006/main">
   <p:cSld>
     <p:spTree>
@@ -10745,7 +11894,7 @@
 </p:sld>
 </file>
 
-<file path=ppt/slides/slide17.xml><?xml version="1.0" encoding="utf-8"?>
+<file path=ppt/slides/slide18.xml><?xml version="1.0" encoding="utf-8"?>
 <p:sld xmlns:a="http://schemas.openxmlformats.org/drawingml/2006/main" xmlns:r="http://schemas.openxmlformats.org/officeDocument/2006/relationships" xmlns:p="http://schemas.openxmlformats.org/presentationml/2006/main">
   <p:cSld>
     <p:spTree>
@@ -10764,36 +11913,6 @@
       </p:grpSpPr>
       <p:pic>
         <p:nvPicPr>
-          <p:cNvPr id="2" name="Picture 1">
-            <a:extLst>
-              <a:ext uri="{FF2B5EF4-FFF2-40B4-BE49-F238E27FC236}">
-                <a16:creationId xmlns:a16="http://schemas.microsoft.com/office/drawing/2014/main" id="{B92E5B48-B4BD-4E2D-AF51-ACB17E5BBE32}"/>
-              </a:ext>
-            </a:extLst>
-          </p:cNvPr>
-          <p:cNvPicPr>
-            <a:picLocks noChangeAspect="1"/>
-          </p:cNvPicPr>
-          <p:nvPr/>
-        </p:nvPicPr>
-        <p:blipFill>
-          <a:blip r:embed="rId2"/>
-          <a:stretch>
-            <a:fillRect/>
-          </a:stretch>
-        </p:blipFill>
-        <p:spPr>
-          <a:xfrm>
-            <a:off x="416665" y="1703477"/>
-            <a:ext cx="6546975" cy="3739318"/>
-          </a:xfrm>
-          <a:prstGeom prst="rect">
-            <a:avLst/>
-          </a:prstGeom>
-        </p:spPr>
-      </p:pic>
-      <p:pic>
-        <p:nvPicPr>
           <p:cNvPr id="4" name="Grafik 3"/>
           <p:cNvPicPr>
             <a:picLocks noChangeAspect="1"/>
@@ -10801,7 +11920,7 @@
           <p:nvPr/>
         </p:nvPicPr>
         <p:blipFill>
-          <a:blip r:embed="rId3" cstate="print">
+          <a:blip r:embed="rId2" cstate="print">
             <a:extLst>
               <a:ext uri="{28A0092B-C50C-407E-A947-70E740481C1C}">
                 <a14:useLocalDpi xmlns:a14="http://schemas.microsoft.com/office/drawing/2010/main" val="0"/>
@@ -11353,10 +12472,10 @@
       </p:sp>
       <p:pic>
         <p:nvPicPr>
-          <p:cNvPr id="14" name="Picture 13">
+          <p:cNvPr id="9" name="Picture 8">
             <a:extLst>
               <a:ext uri="{FF2B5EF4-FFF2-40B4-BE49-F238E27FC236}">
-                <a16:creationId xmlns:a16="http://schemas.microsoft.com/office/drawing/2014/main" id="{E4DD9A1C-B828-4836-9288-C50F49B6AC94}"/>
+                <a16:creationId xmlns:a16="http://schemas.microsoft.com/office/drawing/2014/main" id="{6915663D-F070-4EAA-A41E-8F487C8932C8}"/>
               </a:ext>
             </a:extLst>
           </p:cNvPr>
@@ -11366,7 +12485,7 @@
           <p:nvPr/>
         </p:nvPicPr>
         <p:blipFill>
-          <a:blip r:embed="rId4">
+          <a:blip r:embed="rId3">
             <a:extLst>
               <a:ext uri="{28A0092B-C50C-407E-A947-70E740481C1C}">
                 <a14:useLocalDpi xmlns:a14="http://schemas.microsoft.com/office/drawing/2010/main" val="0"/>
@@ -11379,84 +12498,44 @@
         </p:blipFill>
         <p:spPr>
           <a:xfrm>
-            <a:off x="7281720" y="1664320"/>
-            <a:ext cx="5597810" cy="3656861"/>
+            <a:off x="5904408" y="1664320"/>
+            <a:ext cx="5597810" cy="3656860"/>
           </a:xfrm>
           <a:prstGeom prst="rect">
             <a:avLst/>
           </a:prstGeom>
         </p:spPr>
       </p:pic>
-      <p:sp>
-        <p:nvSpPr>
-          <p:cNvPr id="15" name="Rectangle 14">
+      <p:pic>
+        <p:nvPicPr>
+          <p:cNvPr id="2" name="Picture 1">
             <a:extLst>
               <a:ext uri="{FF2B5EF4-FFF2-40B4-BE49-F238E27FC236}">
-                <a16:creationId xmlns:a16="http://schemas.microsoft.com/office/drawing/2014/main" id="{3418906A-5D8B-4918-B081-2D41CAC383CA}"/>
+                <a16:creationId xmlns:a16="http://schemas.microsoft.com/office/drawing/2014/main" id="{B92E5B48-B4BD-4E2D-AF51-ACB17E5BBE32}"/>
               </a:ext>
             </a:extLst>
           </p:cNvPr>
-          <p:cNvSpPr/>
+          <p:cNvPicPr>
+            <a:picLocks noChangeAspect="1"/>
+          </p:cNvPicPr>
           <p:nvPr/>
-        </p:nvSpPr>
-        <p:spPr bwMode="auto">
+        </p:nvPicPr>
+        <p:blipFill>
+          <a:blip r:embed="rId4"/>
+          <a:stretch>
+            <a:fillRect/>
+          </a:stretch>
+        </p:blipFill>
+        <p:spPr>
           <a:xfrm>
-            <a:off x="10083243" y="1661354"/>
-            <a:ext cx="2971385" cy="3656862"/>
+            <a:off x="416665" y="1703477"/>
+            <a:ext cx="6546975" cy="3739318"/>
           </a:xfrm>
           <a:prstGeom prst="rect">
             <a:avLst/>
           </a:prstGeom>
-          <a:solidFill>
-            <a:schemeClr val="bg1"/>
-          </a:solidFill>
-          <a:ln w="9525" cap="flat" cmpd="sng" algn="ctr">
-            <a:noFill/>
-            <a:prstDash val="solid"/>
-            <a:round/>
-            <a:headEnd type="none" w="med" len="med"/>
-            <a:tailEnd type="none" w="med" len="med"/>
-          </a:ln>
-          <a:effectLst/>
-          <a:extLst/>
         </p:spPr>
-        <p:txBody>
-          <a:bodyPr vert="horz" wrap="square" lIns="91440" tIns="45720" rIns="91440" bIns="45720" numCol="1" rtlCol="0" anchor="t" anchorCtr="0" compatLnSpc="1">
-            <a:prstTxWarp prst="textNoShape">
-              <a:avLst/>
-            </a:prstTxWarp>
-          </a:bodyPr>
-          <a:lstStyle/>
-          <a:p>
-            <a:pPr marL="0" marR="0" indent="0" algn="l" defTabSz="449263" rtl="0" eaLnBrk="1" fontAlgn="base" latinLnBrk="0" hangingPunct="0">
-              <a:lnSpc>
-                <a:spcPct val="93000"/>
-              </a:lnSpc>
-              <a:spcBef>
-                <a:spcPct val="0"/>
-              </a:spcBef>
-              <a:spcAft>
-                <a:spcPct val="0"/>
-              </a:spcAft>
-              <a:buClr>
-                <a:srgbClr val="000000"/>
-              </a:buClr>
-              <a:buSzPct val="100000"/>
-              <a:buFont typeface="Times New Roman" panose="02020603050405020304" pitchFamily="18" charset="0"/>
-              <a:buNone/>
-              <a:tabLst/>
-            </a:pPr>
-            <a:endParaRPr kumimoji="0" lang="de-DE" sz="1800" b="0" i="0" u="none" strike="noStrike" cap="none" normalizeH="0" baseline="0">
-              <a:ln>
-                <a:noFill/>
-              </a:ln>
-              <a:effectLst/>
-              <a:latin typeface="Arial" panose="020B0604020202020204" pitchFamily="34" charset="0"/>
-              <a:ea typeface="Microsoft YaHei" panose="020B0503020204020204" pitchFamily="34" charset="-122"/>
-            </a:endParaRPr>
-          </a:p>
-        </p:txBody>
-      </p:sp>
+      </p:pic>
     </p:spTree>
     <p:extLst>
       <p:ext uri="{BB962C8B-B14F-4D97-AF65-F5344CB8AC3E}">
@@ -14043,42 +15122,6 @@
           </a:p>
         </p:txBody>
       </p:sp>
-      <p:pic>
-        <p:nvPicPr>
-          <p:cNvPr id="9" name="Picture 8">
-            <a:extLst>
-              <a:ext uri="{FF2B5EF4-FFF2-40B4-BE49-F238E27FC236}">
-                <a16:creationId xmlns:a16="http://schemas.microsoft.com/office/drawing/2014/main" id="{19B3D71A-97C6-4E67-B9AA-063BF54DD5C7}"/>
-              </a:ext>
-            </a:extLst>
-          </p:cNvPr>
-          <p:cNvPicPr>
-            <a:picLocks noChangeAspect="1"/>
-          </p:cNvPicPr>
-          <p:nvPr/>
-        </p:nvPicPr>
-        <p:blipFill>
-          <a:blip r:embed="rId3">
-            <a:extLst>
-              <a:ext uri="{28A0092B-C50C-407E-A947-70E740481C1C}">
-                <a14:useLocalDpi xmlns:a14="http://schemas.microsoft.com/office/drawing/2010/main" val="0"/>
-              </a:ext>
-            </a:extLst>
-          </a:blip>
-          <a:stretch>
-            <a:fillRect/>
-          </a:stretch>
-        </p:blipFill>
-        <p:spPr>
-          <a:xfrm>
-            <a:off x="4289238" y="1664320"/>
-            <a:ext cx="5640004" cy="3656861"/>
-          </a:xfrm>
-          <a:prstGeom prst="rect">
-            <a:avLst/>
-          </a:prstGeom>
-        </p:spPr>
-      </p:pic>
       <p:sp>
         <p:nvSpPr>
           <p:cNvPr id="11" name="Text Box 1">
@@ -14507,6 +15550,42 @@
           </a:p>
         </p:txBody>
       </p:sp>
+      <p:pic>
+        <p:nvPicPr>
+          <p:cNvPr id="10" name="Picture 9">
+            <a:extLst>
+              <a:ext uri="{FF2B5EF4-FFF2-40B4-BE49-F238E27FC236}">
+                <a16:creationId xmlns:a16="http://schemas.microsoft.com/office/drawing/2014/main" id="{2576B66F-983B-43E0-9971-7EF52D22C5B6}"/>
+              </a:ext>
+            </a:extLst>
+          </p:cNvPr>
+          <p:cNvPicPr>
+            <a:picLocks noChangeAspect="1"/>
+          </p:cNvPicPr>
+          <p:nvPr/>
+        </p:nvPicPr>
+        <p:blipFill>
+          <a:blip r:embed="rId3">
+            <a:extLst>
+              <a:ext uri="{28A0092B-C50C-407E-A947-70E740481C1C}">
+                <a14:useLocalDpi xmlns:a14="http://schemas.microsoft.com/office/drawing/2010/main" val="0"/>
+              </a:ext>
+            </a:extLst>
+          </a:blip>
+          <a:stretch>
+            <a:fillRect/>
+          </a:stretch>
+        </p:blipFill>
+        <p:spPr>
+          <a:xfrm>
+            <a:off x="4310335" y="1664320"/>
+            <a:ext cx="5597810" cy="3656861"/>
+          </a:xfrm>
+          <a:prstGeom prst="rect">
+            <a:avLst/>
+          </a:prstGeom>
+        </p:spPr>
+      </p:pic>
     </p:spTree>
     <p:extLst>
       <p:ext uri="{BB962C8B-B14F-4D97-AF65-F5344CB8AC3E}">
@@ -15473,42 +16552,6 @@
       </p:grpSpPr>
       <p:pic>
         <p:nvPicPr>
-          <p:cNvPr id="9" name="Picture 8">
-            <a:extLst>
-              <a:ext uri="{FF2B5EF4-FFF2-40B4-BE49-F238E27FC236}">
-                <a16:creationId xmlns:a16="http://schemas.microsoft.com/office/drawing/2014/main" id="{19B3D71A-97C6-4E67-B9AA-063BF54DD5C7}"/>
-              </a:ext>
-            </a:extLst>
-          </p:cNvPr>
-          <p:cNvPicPr>
-            <a:picLocks noChangeAspect="1"/>
-          </p:cNvPicPr>
-          <p:nvPr/>
-        </p:nvPicPr>
-        <p:blipFill>
-          <a:blip r:embed="rId2">
-            <a:extLst>
-              <a:ext uri="{28A0092B-C50C-407E-A947-70E740481C1C}">
-                <a14:useLocalDpi xmlns:a14="http://schemas.microsoft.com/office/drawing/2010/main" val="0"/>
-              </a:ext>
-            </a:extLst>
-          </a:blip>
-          <a:stretch>
-            <a:fillRect/>
-          </a:stretch>
-        </p:blipFill>
-        <p:spPr>
-          <a:xfrm>
-            <a:off x="6271237" y="1664320"/>
-            <a:ext cx="5597810" cy="3656861"/>
-          </a:xfrm>
-          <a:prstGeom prst="rect">
-            <a:avLst/>
-          </a:prstGeom>
-        </p:spPr>
-      </p:pic>
-      <p:pic>
-        <p:nvPicPr>
           <p:cNvPr id="4" name="Grafik 3"/>
           <p:cNvPicPr>
             <a:picLocks noChangeAspect="1"/>
@@ -15516,7 +16559,7 @@
           <p:nvPr/>
         </p:nvPicPr>
         <p:blipFill>
-          <a:blip r:embed="rId3" cstate="print">
+          <a:blip r:embed="rId2" cstate="print">
             <a:extLst>
               <a:ext uri="{28A0092B-C50C-407E-A947-70E740481C1C}">
                 <a14:useLocalDpi xmlns:a14="http://schemas.microsoft.com/office/drawing/2010/main" val="0"/>
@@ -16218,76 +17261,42 @@
           </a:p>
         </p:txBody>
       </p:sp>
-      <p:sp>
-        <p:nvSpPr>
-          <p:cNvPr id="3" name="Rectangle 2">
+      <p:pic>
+        <p:nvPicPr>
+          <p:cNvPr id="8" name="Picture 7">
             <a:extLst>
               <a:ext uri="{FF2B5EF4-FFF2-40B4-BE49-F238E27FC236}">
-                <a16:creationId xmlns:a16="http://schemas.microsoft.com/office/drawing/2014/main" id="{4AA07C47-A184-449F-A4E1-30476D9033D9}"/>
+                <a16:creationId xmlns:a16="http://schemas.microsoft.com/office/drawing/2014/main" id="{208899E0-9E2F-421A-8118-E3196CFBB294}"/>
               </a:ext>
             </a:extLst>
           </p:cNvPr>
-          <p:cNvSpPr/>
+          <p:cNvPicPr>
+            <a:picLocks noChangeAspect="1"/>
+          </p:cNvPicPr>
           <p:nvPr/>
-        </p:nvSpPr>
-        <p:spPr bwMode="auto">
+        </p:nvPicPr>
+        <p:blipFill>
+          <a:blip r:embed="rId3">
+            <a:extLst>
+              <a:ext uri="{28A0092B-C50C-407E-A947-70E740481C1C}">
+                <a14:useLocalDpi xmlns:a14="http://schemas.microsoft.com/office/drawing/2010/main" val="0"/>
+              </a:ext>
+            </a:extLst>
+          </a:blip>
+          <a:stretch>
+            <a:fillRect/>
+          </a:stretch>
+        </p:blipFill>
+        <p:spPr>
           <a:xfrm>
-            <a:off x="9072760" y="1661354"/>
-            <a:ext cx="2971385" cy="3656862"/>
+            <a:off x="4310335" y="1664320"/>
+            <a:ext cx="5597810" cy="3656860"/>
           </a:xfrm>
           <a:prstGeom prst="rect">
             <a:avLst/>
           </a:prstGeom>
-          <a:solidFill>
-            <a:schemeClr val="bg1"/>
-          </a:solidFill>
-          <a:ln w="9525" cap="flat" cmpd="sng" algn="ctr">
-            <a:noFill/>
-            <a:prstDash val="solid"/>
-            <a:round/>
-            <a:headEnd type="none" w="med" len="med"/>
-            <a:tailEnd type="none" w="med" len="med"/>
-          </a:ln>
-          <a:effectLst/>
-          <a:extLst/>
         </p:spPr>
-        <p:txBody>
-          <a:bodyPr vert="horz" wrap="square" lIns="91440" tIns="45720" rIns="91440" bIns="45720" numCol="1" rtlCol="0" anchor="t" anchorCtr="0" compatLnSpc="1">
-            <a:prstTxWarp prst="textNoShape">
-              <a:avLst/>
-            </a:prstTxWarp>
-          </a:bodyPr>
-          <a:lstStyle/>
-          <a:p>
-            <a:pPr marL="0" marR="0" indent="0" algn="l" defTabSz="449263" rtl="0" eaLnBrk="1" fontAlgn="base" latinLnBrk="0" hangingPunct="0">
-              <a:lnSpc>
-                <a:spcPct val="93000"/>
-              </a:lnSpc>
-              <a:spcBef>
-                <a:spcPct val="0"/>
-              </a:spcBef>
-              <a:spcAft>
-                <a:spcPct val="0"/>
-              </a:spcAft>
-              <a:buClr>
-                <a:srgbClr val="000000"/>
-              </a:buClr>
-              <a:buSzPct val="100000"/>
-              <a:buFont typeface="Times New Roman" panose="02020603050405020304" pitchFamily="18" charset="0"/>
-              <a:buNone/>
-              <a:tabLst/>
-            </a:pPr>
-            <a:endParaRPr kumimoji="0" lang="de-DE" sz="1800" b="0" i="0" u="none" strike="noStrike" cap="none" normalizeH="0" baseline="0">
-              <a:ln>
-                <a:noFill/>
-              </a:ln>
-              <a:effectLst/>
-              <a:latin typeface="Arial" panose="020B0604020202020204" pitchFamily="34" charset="0"/>
-              <a:ea typeface="Microsoft YaHei" panose="020B0503020204020204" pitchFamily="34" charset="-122"/>
-            </a:endParaRPr>
-          </a:p>
-        </p:txBody>
-      </p:sp>
+      </p:pic>
     </p:spTree>
     <p:extLst>
       <p:ext uri="{BB962C8B-B14F-4D97-AF65-F5344CB8AC3E}">
@@ -16931,15 +17940,21 @@
           <p:nvPr/>
         </p:nvPicPr>
         <p:blipFill>
-          <a:blip r:embed="rId3"/>
+          <a:blip r:embed="rId3">
+            <a:extLst>
+              <a:ext uri="{28A0092B-C50C-407E-A947-70E740481C1C}">
+                <a14:useLocalDpi xmlns:a14="http://schemas.microsoft.com/office/drawing/2010/main" val="0"/>
+              </a:ext>
+            </a:extLst>
+          </a:blip>
           <a:stretch>
             <a:fillRect/>
           </a:stretch>
         </p:blipFill>
         <p:spPr>
           <a:xfrm>
-            <a:off x="5603626" y="2715432"/>
-            <a:ext cx="2801620" cy="2265045"/>
+            <a:off x="5119390" y="2636001"/>
+            <a:ext cx="3360142" cy="2745256"/>
           </a:xfrm>
           <a:prstGeom prst="rect">
             <a:avLst/>
@@ -16959,15 +17974,21 @@
           <p:nvPr/>
         </p:nvPicPr>
         <p:blipFill>
-          <a:blip r:embed="rId4"/>
+          <a:blip r:embed="rId4">
+            <a:extLst>
+              <a:ext uri="{28A0092B-C50C-407E-A947-70E740481C1C}">
+                <a14:useLocalDpi xmlns:a14="http://schemas.microsoft.com/office/drawing/2010/main" val="0"/>
+              </a:ext>
+            </a:extLst>
+          </a:blip>
           <a:stretch>
             <a:fillRect/>
           </a:stretch>
         </p:blipFill>
         <p:spPr>
           <a:xfrm>
-            <a:off x="703158" y="2221772"/>
-            <a:ext cx="3257034" cy="1807951"/>
+            <a:off x="431800" y="2115196"/>
+            <a:ext cx="3360143" cy="1914528"/>
           </a:xfrm>
           <a:prstGeom prst="rect">
             <a:avLst/>
@@ -17109,15 +18130,21 @@
           <p:nvPr/>
         </p:nvPicPr>
         <p:blipFill>
-          <a:blip r:embed="rId5"/>
+          <a:blip r:embed="rId5">
+            <a:extLst>
+              <a:ext uri="{28A0092B-C50C-407E-A947-70E740481C1C}">
+                <a14:useLocalDpi xmlns:a14="http://schemas.microsoft.com/office/drawing/2010/main" val="0"/>
+              </a:ext>
+            </a:extLst>
+          </a:blip>
           <a:stretch>
             <a:fillRect/>
           </a:stretch>
         </p:blipFill>
         <p:spPr>
           <a:xfrm>
-            <a:off x="657707" y="4275435"/>
-            <a:ext cx="3060669" cy="816669"/>
+            <a:off x="431800" y="4155132"/>
+            <a:ext cx="3360142" cy="1371653"/>
           </a:xfrm>
           <a:prstGeom prst="rect">
             <a:avLst/>
@@ -17863,7 +18890,7 @@
           <p:nvPr/>
         </p:nvPicPr>
         <p:blipFill>
-          <a:blip r:embed="rId4" cstate="print">
+          <a:blip r:embed="rId4">
             <a:extLst>
               <a:ext uri="{28A0092B-C50C-407E-A947-70E740481C1C}">
                 <a14:useLocalDpi xmlns:a14="http://schemas.microsoft.com/office/drawing/2010/main" val="0"/>
@@ -17876,8 +18903,8 @@
         </p:blipFill>
         <p:spPr>
           <a:xfrm>
-            <a:off x="676282" y="2643251"/>
-            <a:ext cx="3334385" cy="1371600"/>
+            <a:off x="359792" y="3945141"/>
+            <a:ext cx="3240360" cy="1451607"/>
           </a:xfrm>
           <a:prstGeom prst="rect">
             <a:avLst/>
@@ -17886,10 +18913,10 @@
       </p:pic>
       <p:pic>
         <p:nvPicPr>
-          <p:cNvPr id="15" name="Picture 14">
+          <p:cNvPr id="9" name="Picture 8">
             <a:extLst>
               <a:ext uri="{FF2B5EF4-FFF2-40B4-BE49-F238E27FC236}">
-                <a16:creationId xmlns:a16="http://schemas.microsoft.com/office/drawing/2014/main" id="{86F28BFC-C001-4094-989F-363B545EBD57}"/>
+                <a16:creationId xmlns:a16="http://schemas.microsoft.com/office/drawing/2014/main" id="{DFC32CF7-CCC5-49BB-B7C8-296DE1F2290F}"/>
               </a:ext>
             </a:extLst>
           </p:cNvPr>
@@ -17897,21 +18924,495 @@
           <p:nvPr/>
         </p:nvPicPr>
         <p:blipFill>
-          <a:blip r:embed="rId5"/>
+          <a:blip r:embed="rId5">
+            <a:extLst>
+              <a:ext uri="{28A0092B-C50C-407E-A947-70E740481C1C}">
+                <a14:useLocalDpi xmlns:a14="http://schemas.microsoft.com/office/drawing/2010/main" val="0"/>
+              </a:ext>
+            </a:extLst>
+          </a:blip>
           <a:stretch>
             <a:fillRect/>
           </a:stretch>
         </p:blipFill>
         <p:spPr>
           <a:xfrm>
-            <a:off x="791840" y="4111816"/>
-            <a:ext cx="3644265" cy="875030"/>
+            <a:off x="359792" y="2403257"/>
+            <a:ext cx="3240360" cy="1393703"/>
           </a:xfrm>
           <a:prstGeom prst="rect">
             <a:avLst/>
           </a:prstGeom>
         </p:spPr>
       </p:pic>
+      <p:sp>
+        <p:nvSpPr>
+          <p:cNvPr id="11" name="Rectangle 10">
+            <a:extLst>
+              <a:ext uri="{FF2B5EF4-FFF2-40B4-BE49-F238E27FC236}">
+                <a16:creationId xmlns:a16="http://schemas.microsoft.com/office/drawing/2014/main" id="{755CD311-85E4-4953-B803-A1600B9D28AD}"/>
+              </a:ext>
+            </a:extLst>
+          </p:cNvPr>
+          <p:cNvSpPr/>
+          <p:nvPr/>
+        </p:nvSpPr>
+        <p:spPr bwMode="auto">
+          <a:xfrm>
+            <a:off x="784091" y="4499079"/>
+            <a:ext cx="2808312" cy="144016"/>
+          </a:xfrm>
+          <a:prstGeom prst="rect">
+            <a:avLst/>
+          </a:prstGeom>
+          <a:solidFill>
+            <a:srgbClr val="FFC000">
+              <a:alpha val="50000"/>
+            </a:srgbClr>
+          </a:solidFill>
+          <a:ln>
+            <a:noFill/>
+          </a:ln>
+          <a:extLst/>
+        </p:spPr>
+        <p:style>
+          <a:lnRef idx="0">
+            <a:scrgbClr r="0" g="0" b="0"/>
+          </a:lnRef>
+          <a:fillRef idx="0">
+            <a:scrgbClr r="0" g="0" b="0"/>
+          </a:fillRef>
+          <a:effectRef idx="0">
+            <a:scrgbClr r="0" g="0" b="0"/>
+          </a:effectRef>
+          <a:fontRef idx="minor">
+            <a:schemeClr val="lt1"/>
+          </a:fontRef>
+        </p:style>
+        <p:txBody>
+          <a:bodyPr vert="horz" wrap="square" lIns="91440" tIns="45720" rIns="91440" bIns="45720" numCol="1" rtlCol="0" anchor="t" anchorCtr="0" compatLnSpc="1">
+            <a:prstTxWarp prst="textNoShape">
+              <a:avLst/>
+            </a:prstTxWarp>
+          </a:bodyPr>
+          <a:lstStyle/>
+          <a:p>
+            <a:pPr marL="0" marR="0" indent="0" algn="l" defTabSz="449263" rtl="0" eaLnBrk="1" fontAlgn="base" latinLnBrk="0" hangingPunct="0">
+              <a:lnSpc>
+                <a:spcPct val="93000"/>
+              </a:lnSpc>
+              <a:spcBef>
+                <a:spcPct val="0"/>
+              </a:spcBef>
+              <a:spcAft>
+                <a:spcPct val="0"/>
+              </a:spcAft>
+              <a:buClr>
+                <a:srgbClr val="000000"/>
+              </a:buClr>
+              <a:buSzPct val="100000"/>
+              <a:buFont typeface="Times New Roman" panose="02020603050405020304" pitchFamily="18" charset="0"/>
+              <a:buNone/>
+              <a:tabLst/>
+            </a:pPr>
+            <a:endParaRPr kumimoji="0" lang="de-DE" sz="1800" b="0" i="0" u="none" strike="noStrike" cap="none" normalizeH="0" baseline="0">
+              <a:ln>
+                <a:noFill/>
+              </a:ln>
+              <a:effectLst/>
+              <a:latin typeface="Arial" panose="020B0604020202020204" pitchFamily="34" charset="0"/>
+              <a:ea typeface="Microsoft YaHei" panose="020B0503020204020204" pitchFamily="34" charset="-122"/>
+            </a:endParaRPr>
+          </a:p>
+        </p:txBody>
+      </p:sp>
+      <p:sp>
+        <p:nvSpPr>
+          <p:cNvPr id="12" name="Rectangle 11">
+            <a:extLst>
+              <a:ext uri="{FF2B5EF4-FFF2-40B4-BE49-F238E27FC236}">
+                <a16:creationId xmlns:a16="http://schemas.microsoft.com/office/drawing/2014/main" id="{3ED32641-3219-4457-9930-84B83E014285}"/>
+              </a:ext>
+            </a:extLst>
+          </p:cNvPr>
+          <p:cNvSpPr/>
+          <p:nvPr/>
+        </p:nvSpPr>
+        <p:spPr bwMode="auto">
+          <a:xfrm>
+            <a:off x="784091" y="4315230"/>
+            <a:ext cx="2808312" cy="144016"/>
+          </a:xfrm>
+          <a:prstGeom prst="rect">
+            <a:avLst/>
+          </a:prstGeom>
+          <a:solidFill>
+            <a:srgbClr val="FFC000">
+              <a:alpha val="50000"/>
+            </a:srgbClr>
+          </a:solidFill>
+          <a:ln>
+            <a:noFill/>
+          </a:ln>
+          <a:extLst/>
+        </p:spPr>
+        <p:style>
+          <a:lnRef idx="0">
+            <a:scrgbClr r="0" g="0" b="0"/>
+          </a:lnRef>
+          <a:fillRef idx="0">
+            <a:scrgbClr r="0" g="0" b="0"/>
+          </a:fillRef>
+          <a:effectRef idx="0">
+            <a:scrgbClr r="0" g="0" b="0"/>
+          </a:effectRef>
+          <a:fontRef idx="minor">
+            <a:schemeClr val="lt1"/>
+          </a:fontRef>
+        </p:style>
+        <p:txBody>
+          <a:bodyPr vert="horz" wrap="square" lIns="91440" tIns="45720" rIns="91440" bIns="45720" numCol="1" rtlCol="0" anchor="t" anchorCtr="0" compatLnSpc="1">
+            <a:prstTxWarp prst="textNoShape">
+              <a:avLst/>
+            </a:prstTxWarp>
+          </a:bodyPr>
+          <a:lstStyle/>
+          <a:p>
+            <a:pPr marL="0" marR="0" indent="0" algn="l" defTabSz="449263" rtl="0" eaLnBrk="1" fontAlgn="base" latinLnBrk="0" hangingPunct="0">
+              <a:lnSpc>
+                <a:spcPct val="93000"/>
+              </a:lnSpc>
+              <a:spcBef>
+                <a:spcPct val="0"/>
+              </a:spcBef>
+              <a:spcAft>
+                <a:spcPct val="0"/>
+              </a:spcAft>
+              <a:buClr>
+                <a:srgbClr val="000000"/>
+              </a:buClr>
+              <a:buSzPct val="100000"/>
+              <a:buFont typeface="Times New Roman" panose="02020603050405020304" pitchFamily="18" charset="0"/>
+              <a:buNone/>
+              <a:tabLst/>
+            </a:pPr>
+            <a:endParaRPr kumimoji="0" lang="de-DE" sz="1800" b="0" i="0" u="none" strike="noStrike" cap="none" normalizeH="0" baseline="0">
+              <a:ln>
+                <a:noFill/>
+              </a:ln>
+              <a:effectLst/>
+              <a:latin typeface="Arial" panose="020B0604020202020204" pitchFamily="34" charset="0"/>
+              <a:ea typeface="Microsoft YaHei" panose="020B0503020204020204" pitchFamily="34" charset="-122"/>
+            </a:endParaRPr>
+          </a:p>
+        </p:txBody>
+      </p:sp>
+      <p:sp>
+        <p:nvSpPr>
+          <p:cNvPr id="16" name="Rectangle 15">
+            <a:extLst>
+              <a:ext uri="{FF2B5EF4-FFF2-40B4-BE49-F238E27FC236}">
+                <a16:creationId xmlns:a16="http://schemas.microsoft.com/office/drawing/2014/main" id="{19FF26AB-55DB-4593-821E-EBA5C67F0989}"/>
+              </a:ext>
+            </a:extLst>
+          </p:cNvPr>
+          <p:cNvSpPr/>
+          <p:nvPr/>
+        </p:nvSpPr>
+        <p:spPr bwMode="auto">
+          <a:xfrm>
+            <a:off x="784091" y="4660618"/>
+            <a:ext cx="2808312" cy="144016"/>
+          </a:xfrm>
+          <a:prstGeom prst="rect">
+            <a:avLst/>
+          </a:prstGeom>
+          <a:solidFill>
+            <a:srgbClr val="FFC000">
+              <a:alpha val="50000"/>
+            </a:srgbClr>
+          </a:solidFill>
+          <a:ln>
+            <a:noFill/>
+          </a:ln>
+          <a:extLst/>
+        </p:spPr>
+        <p:style>
+          <a:lnRef idx="0">
+            <a:scrgbClr r="0" g="0" b="0"/>
+          </a:lnRef>
+          <a:fillRef idx="0">
+            <a:scrgbClr r="0" g="0" b="0"/>
+          </a:fillRef>
+          <a:effectRef idx="0">
+            <a:scrgbClr r="0" g="0" b="0"/>
+          </a:effectRef>
+          <a:fontRef idx="minor">
+            <a:schemeClr val="lt1"/>
+          </a:fontRef>
+        </p:style>
+        <p:txBody>
+          <a:bodyPr vert="horz" wrap="square" lIns="91440" tIns="45720" rIns="91440" bIns="45720" numCol="1" rtlCol="0" anchor="t" anchorCtr="0" compatLnSpc="1">
+            <a:prstTxWarp prst="textNoShape">
+              <a:avLst/>
+            </a:prstTxWarp>
+          </a:bodyPr>
+          <a:lstStyle/>
+          <a:p>
+            <a:pPr marL="0" marR="0" indent="0" algn="l" defTabSz="449263" rtl="0" eaLnBrk="1" fontAlgn="base" latinLnBrk="0" hangingPunct="0">
+              <a:lnSpc>
+                <a:spcPct val="93000"/>
+              </a:lnSpc>
+              <a:spcBef>
+                <a:spcPct val="0"/>
+              </a:spcBef>
+              <a:spcAft>
+                <a:spcPct val="0"/>
+              </a:spcAft>
+              <a:buClr>
+                <a:srgbClr val="000000"/>
+              </a:buClr>
+              <a:buSzPct val="100000"/>
+              <a:buFont typeface="Times New Roman" panose="02020603050405020304" pitchFamily="18" charset="0"/>
+              <a:buNone/>
+              <a:tabLst/>
+            </a:pPr>
+            <a:endParaRPr kumimoji="0" lang="de-DE" sz="1800" b="0" i="0" u="none" strike="noStrike" cap="none" normalizeH="0" baseline="0">
+              <a:ln>
+                <a:noFill/>
+              </a:ln>
+              <a:effectLst/>
+              <a:latin typeface="Arial" panose="020B0604020202020204" pitchFamily="34" charset="0"/>
+              <a:ea typeface="Microsoft YaHei" panose="020B0503020204020204" pitchFamily="34" charset="-122"/>
+            </a:endParaRPr>
+          </a:p>
+        </p:txBody>
+      </p:sp>
+      <p:sp>
+        <p:nvSpPr>
+          <p:cNvPr id="17" name="Rectangle 16">
+            <a:extLst>
+              <a:ext uri="{FF2B5EF4-FFF2-40B4-BE49-F238E27FC236}">
+                <a16:creationId xmlns:a16="http://schemas.microsoft.com/office/drawing/2014/main" id="{FFE3B402-5EAA-4B1C-AA3F-1D86C95E5B97}"/>
+              </a:ext>
+            </a:extLst>
+          </p:cNvPr>
+          <p:cNvSpPr/>
+          <p:nvPr/>
+        </p:nvSpPr>
+        <p:spPr bwMode="auto">
+          <a:xfrm>
+            <a:off x="784091" y="5167232"/>
+            <a:ext cx="2808312" cy="144016"/>
+          </a:xfrm>
+          <a:prstGeom prst="rect">
+            <a:avLst/>
+          </a:prstGeom>
+          <a:solidFill>
+            <a:srgbClr val="FFC000">
+              <a:alpha val="50000"/>
+            </a:srgbClr>
+          </a:solidFill>
+          <a:ln>
+            <a:noFill/>
+          </a:ln>
+          <a:extLst/>
+        </p:spPr>
+        <p:style>
+          <a:lnRef idx="0">
+            <a:scrgbClr r="0" g="0" b="0"/>
+          </a:lnRef>
+          <a:fillRef idx="0">
+            <a:scrgbClr r="0" g="0" b="0"/>
+          </a:fillRef>
+          <a:effectRef idx="0">
+            <a:scrgbClr r="0" g="0" b="0"/>
+          </a:effectRef>
+          <a:fontRef idx="minor">
+            <a:schemeClr val="lt1"/>
+          </a:fontRef>
+        </p:style>
+        <p:txBody>
+          <a:bodyPr vert="horz" wrap="square" lIns="91440" tIns="45720" rIns="91440" bIns="45720" numCol="1" rtlCol="0" anchor="t" anchorCtr="0" compatLnSpc="1">
+            <a:prstTxWarp prst="textNoShape">
+              <a:avLst/>
+            </a:prstTxWarp>
+          </a:bodyPr>
+          <a:lstStyle/>
+          <a:p>
+            <a:pPr marL="0" marR="0" indent="0" algn="l" defTabSz="449263" rtl="0" eaLnBrk="1" fontAlgn="base" latinLnBrk="0" hangingPunct="0">
+              <a:lnSpc>
+                <a:spcPct val="93000"/>
+              </a:lnSpc>
+              <a:spcBef>
+                <a:spcPct val="0"/>
+              </a:spcBef>
+              <a:spcAft>
+                <a:spcPct val="0"/>
+              </a:spcAft>
+              <a:buClr>
+                <a:srgbClr val="000000"/>
+              </a:buClr>
+              <a:buSzPct val="100000"/>
+              <a:buFont typeface="Times New Roman" panose="02020603050405020304" pitchFamily="18" charset="0"/>
+              <a:buNone/>
+              <a:tabLst/>
+            </a:pPr>
+            <a:endParaRPr kumimoji="0" lang="de-DE" sz="1800" b="0" i="0" u="none" strike="noStrike" cap="none" normalizeH="0" baseline="0">
+              <a:ln>
+                <a:noFill/>
+              </a:ln>
+              <a:effectLst/>
+              <a:latin typeface="Arial" panose="020B0604020202020204" pitchFamily="34" charset="0"/>
+              <a:ea typeface="Microsoft YaHei" panose="020B0503020204020204" pitchFamily="34" charset="-122"/>
+            </a:endParaRPr>
+          </a:p>
+        </p:txBody>
+      </p:sp>
+      <p:sp>
+        <p:nvSpPr>
+          <p:cNvPr id="19" name="TextBox 18">
+            <a:extLst>
+              <a:ext uri="{FF2B5EF4-FFF2-40B4-BE49-F238E27FC236}">
+                <a16:creationId xmlns:a16="http://schemas.microsoft.com/office/drawing/2014/main" id="{B93C2E01-E712-4327-BDE0-7EE84F9870AF}"/>
+              </a:ext>
+            </a:extLst>
+          </p:cNvPr>
+          <p:cNvSpPr txBox="1"/>
+          <p:nvPr/>
+        </p:nvSpPr>
+        <p:spPr>
+          <a:xfrm>
+            <a:off x="3528144" y="4169640"/>
+            <a:ext cx="284052" cy="292709"/>
+          </a:xfrm>
+          <a:prstGeom prst="rect">
+            <a:avLst/>
+          </a:prstGeom>
+          <a:noFill/>
+        </p:spPr>
+        <p:txBody>
+          <a:bodyPr wrap="none" rtlCol="0">
+            <a:spAutoFit/>
+          </a:bodyPr>
+          <a:lstStyle/>
+          <a:p>
+            <a:r>
+              <a:rPr lang="en-GB" sz="1400" dirty="0"/>
+              <a:t>a</a:t>
+            </a:r>
+            <a:endParaRPr lang="de-DE" sz="1400" dirty="0"/>
+          </a:p>
+        </p:txBody>
+      </p:sp>
+      <p:sp>
+        <p:nvSpPr>
+          <p:cNvPr id="20" name="TextBox 19">
+            <a:extLst>
+              <a:ext uri="{FF2B5EF4-FFF2-40B4-BE49-F238E27FC236}">
+                <a16:creationId xmlns:a16="http://schemas.microsoft.com/office/drawing/2014/main" id="{703CB0CD-6505-47D3-8757-E116F29AD545}"/>
+              </a:ext>
+            </a:extLst>
+          </p:cNvPr>
+          <p:cNvSpPr txBox="1"/>
+          <p:nvPr/>
+        </p:nvSpPr>
+        <p:spPr>
+          <a:xfrm>
+            <a:off x="3528144" y="4403262"/>
+            <a:ext cx="284052" cy="292709"/>
+          </a:xfrm>
+          <a:prstGeom prst="rect">
+            <a:avLst/>
+          </a:prstGeom>
+          <a:noFill/>
+        </p:spPr>
+        <p:txBody>
+          <a:bodyPr wrap="none" rtlCol="0">
+            <a:spAutoFit/>
+          </a:bodyPr>
+          <a:lstStyle/>
+          <a:p>
+            <a:r>
+              <a:rPr lang="en-GB" sz="1400" dirty="0"/>
+              <a:t>b</a:t>
+            </a:r>
+            <a:endParaRPr lang="de-DE" sz="1400" dirty="0"/>
+          </a:p>
+        </p:txBody>
+      </p:sp>
+      <p:sp>
+        <p:nvSpPr>
+          <p:cNvPr id="21" name="TextBox 20">
+            <a:extLst>
+              <a:ext uri="{FF2B5EF4-FFF2-40B4-BE49-F238E27FC236}">
+                <a16:creationId xmlns:a16="http://schemas.microsoft.com/office/drawing/2014/main" id="{5BAF8CC5-F5F2-4EFE-BD25-7A755124A157}"/>
+              </a:ext>
+            </a:extLst>
+          </p:cNvPr>
+          <p:cNvSpPr txBox="1"/>
+          <p:nvPr/>
+        </p:nvSpPr>
+        <p:spPr>
+          <a:xfrm>
+            <a:off x="3528144" y="4598875"/>
+            <a:ext cx="458780" cy="292709"/>
+          </a:xfrm>
+          <a:prstGeom prst="rect">
+            <a:avLst/>
+          </a:prstGeom>
+          <a:noFill/>
+        </p:spPr>
+        <p:txBody>
+          <a:bodyPr wrap="none" rtlCol="0">
+            <a:spAutoFit/>
+          </a:bodyPr>
+          <a:lstStyle/>
+          <a:p>
+            <a:r>
+              <a:rPr lang="en-GB" sz="1400" dirty="0"/>
+              <a:t>*, +</a:t>
+            </a:r>
+            <a:endParaRPr lang="de-DE" sz="1400" dirty="0"/>
+          </a:p>
+        </p:txBody>
+      </p:sp>
+      <p:sp>
+        <p:nvSpPr>
+          <p:cNvPr id="22" name="TextBox 21">
+            <a:extLst>
+              <a:ext uri="{FF2B5EF4-FFF2-40B4-BE49-F238E27FC236}">
+                <a16:creationId xmlns:a16="http://schemas.microsoft.com/office/drawing/2014/main" id="{6F0331C4-4982-496E-969E-1BCF66BAA695}"/>
+              </a:ext>
+            </a:extLst>
+          </p:cNvPr>
+          <p:cNvSpPr txBox="1"/>
+          <p:nvPr/>
+        </p:nvSpPr>
+        <p:spPr>
+          <a:xfrm>
+            <a:off x="3540336" y="5055491"/>
+            <a:ext cx="631904" cy="292709"/>
+          </a:xfrm>
+          <a:prstGeom prst="rect">
+            <a:avLst/>
+          </a:prstGeom>
+          <a:noFill/>
+        </p:spPr>
+        <p:txBody>
+          <a:bodyPr wrap="none" rtlCol="0">
+            <a:spAutoFit/>
+          </a:bodyPr>
+          <a:lstStyle/>
+          <a:p>
+            <a:r>
+              <a:rPr lang="en-GB" sz="1400" dirty="0"/>
+              <a:t>h, g, f</a:t>
+            </a:r>
+            <a:endParaRPr lang="de-DE" sz="1400" dirty="0"/>
+          </a:p>
+        </p:txBody>
+      </p:sp>
     </p:spTree>
     <p:extLst>
       <p:ext uri="{BB962C8B-B14F-4D97-AF65-F5344CB8AC3E}">

</xml_diff>